<commit_message>
Python version validation and RPS vid1 setup
</commit_message>
<xml_diff>
--- a/main/games/rock_paper_scissors/Python Program Documentation.pptx
+++ b/main/games/rock_paper_scissors/Python Program Documentation.pptx
@@ -5,37 +5,38 @@
     <p:sldMasterId id="2147483659" r:id="rId4"/>
   </p:sldMasterIdLst>
   <p:notesMasterIdLst>
-    <p:notesMasterId r:id="rId33"/>
+    <p:notesMasterId r:id="rId34"/>
   </p:notesMasterIdLst>
   <p:sldIdLst>
     <p:sldId id="256" r:id="rId5"/>
     <p:sldId id="258" r:id="rId6"/>
-    <p:sldId id="259" r:id="rId7"/>
-    <p:sldId id="260" r:id="rId8"/>
-    <p:sldId id="262" r:id="rId9"/>
-    <p:sldId id="263" r:id="rId10"/>
-    <p:sldId id="261" r:id="rId11"/>
-    <p:sldId id="265" r:id="rId12"/>
-    <p:sldId id="264" r:id="rId13"/>
-    <p:sldId id="271" r:id="rId14"/>
-    <p:sldId id="272" r:id="rId15"/>
-    <p:sldId id="266" r:id="rId16"/>
-    <p:sldId id="270" r:id="rId17"/>
-    <p:sldId id="276" r:id="rId18"/>
-    <p:sldId id="273" r:id="rId19"/>
-    <p:sldId id="274" r:id="rId20"/>
-    <p:sldId id="275" r:id="rId21"/>
-    <p:sldId id="277" r:id="rId22"/>
-    <p:sldId id="278" r:id="rId23"/>
-    <p:sldId id="279" r:id="rId24"/>
-    <p:sldId id="280" r:id="rId25"/>
-    <p:sldId id="283" r:id="rId26"/>
-    <p:sldId id="282" r:id="rId27"/>
-    <p:sldId id="281" r:id="rId28"/>
-    <p:sldId id="284" r:id="rId29"/>
-    <p:sldId id="285" r:id="rId30"/>
-    <p:sldId id="286" r:id="rId31"/>
-    <p:sldId id="287" r:id="rId32"/>
+    <p:sldId id="260" r:id="rId7"/>
+    <p:sldId id="259" r:id="rId8"/>
+    <p:sldId id="288" r:id="rId9"/>
+    <p:sldId id="262" r:id="rId10"/>
+    <p:sldId id="263" r:id="rId11"/>
+    <p:sldId id="261" r:id="rId12"/>
+    <p:sldId id="265" r:id="rId13"/>
+    <p:sldId id="264" r:id="rId14"/>
+    <p:sldId id="271" r:id="rId15"/>
+    <p:sldId id="272" r:id="rId16"/>
+    <p:sldId id="266" r:id="rId17"/>
+    <p:sldId id="270" r:id="rId18"/>
+    <p:sldId id="276" r:id="rId19"/>
+    <p:sldId id="273" r:id="rId20"/>
+    <p:sldId id="274" r:id="rId21"/>
+    <p:sldId id="275" r:id="rId22"/>
+    <p:sldId id="277" r:id="rId23"/>
+    <p:sldId id="278" r:id="rId24"/>
+    <p:sldId id="279" r:id="rId25"/>
+    <p:sldId id="280" r:id="rId26"/>
+    <p:sldId id="283" r:id="rId27"/>
+    <p:sldId id="282" r:id="rId28"/>
+    <p:sldId id="281" r:id="rId29"/>
+    <p:sldId id="284" r:id="rId30"/>
+    <p:sldId id="285" r:id="rId31"/>
+    <p:sldId id="286" r:id="rId32"/>
+    <p:sldId id="287" r:id="rId33"/>
   </p:sldIdLst>
   <p:sldSz cx="9144000" cy="5143500" type="screen16x9"/>
   <p:notesSz cx="6858000" cy="9144000"/>
@@ -982,7 +983,7 @@
     </p:spTree>
     <p:extLst>
       <p:ext uri="{BB962C8B-B14F-4D97-AF65-F5344CB8AC3E}">
-        <p14:creationId xmlns:p14="http://schemas.microsoft.com/office/powerpoint/2010/main" val="4124737771"/>
+        <p14:creationId xmlns:p14="http://schemas.microsoft.com/office/powerpoint/2010/main" val="2935618172"/>
       </p:ext>
     </p:extLst>
   </p:cSld>
@@ -1091,7 +1092,7 @@
     </p:spTree>
     <p:extLst>
       <p:ext uri="{BB962C8B-B14F-4D97-AF65-F5344CB8AC3E}">
-        <p14:creationId xmlns:p14="http://schemas.microsoft.com/office/powerpoint/2010/main" val="3579829201"/>
+        <p14:creationId xmlns:p14="http://schemas.microsoft.com/office/powerpoint/2010/main" val="4124737771"/>
       </p:ext>
     </p:extLst>
   </p:cSld>
@@ -1200,7 +1201,7 @@
     </p:spTree>
     <p:extLst>
       <p:ext uri="{BB962C8B-B14F-4D97-AF65-F5344CB8AC3E}">
-        <p14:creationId xmlns:p14="http://schemas.microsoft.com/office/powerpoint/2010/main" val="1233197778"/>
+        <p14:creationId xmlns:p14="http://schemas.microsoft.com/office/powerpoint/2010/main" val="3579829201"/>
       </p:ext>
     </p:extLst>
   </p:cSld>
@@ -1309,7 +1310,7 @@
     </p:spTree>
     <p:extLst>
       <p:ext uri="{BB962C8B-B14F-4D97-AF65-F5344CB8AC3E}">
-        <p14:creationId xmlns:p14="http://schemas.microsoft.com/office/powerpoint/2010/main" val="1854659955"/>
+        <p14:creationId xmlns:p14="http://schemas.microsoft.com/office/powerpoint/2010/main" val="1233197778"/>
       </p:ext>
     </p:extLst>
   </p:cSld>
@@ -1418,7 +1419,7 @@
     </p:spTree>
     <p:extLst>
       <p:ext uri="{BB962C8B-B14F-4D97-AF65-F5344CB8AC3E}">
-        <p14:creationId xmlns:p14="http://schemas.microsoft.com/office/powerpoint/2010/main" val="1567913487"/>
+        <p14:creationId xmlns:p14="http://schemas.microsoft.com/office/powerpoint/2010/main" val="1854659955"/>
       </p:ext>
     </p:extLst>
   </p:cSld>
@@ -1527,7 +1528,7 @@
     </p:spTree>
     <p:extLst>
       <p:ext uri="{BB962C8B-B14F-4D97-AF65-F5344CB8AC3E}">
-        <p14:creationId xmlns:p14="http://schemas.microsoft.com/office/powerpoint/2010/main" val="745779560"/>
+        <p14:creationId xmlns:p14="http://schemas.microsoft.com/office/powerpoint/2010/main" val="1567913487"/>
       </p:ext>
     </p:extLst>
   </p:cSld>
@@ -1636,7 +1637,7 @@
     </p:spTree>
     <p:extLst>
       <p:ext uri="{BB962C8B-B14F-4D97-AF65-F5344CB8AC3E}">
-        <p14:creationId xmlns:p14="http://schemas.microsoft.com/office/powerpoint/2010/main" val="3926368428"/>
+        <p14:creationId xmlns:p14="http://schemas.microsoft.com/office/powerpoint/2010/main" val="745779560"/>
       </p:ext>
     </p:extLst>
   </p:cSld>
@@ -1745,7 +1746,7 @@
     </p:spTree>
     <p:extLst>
       <p:ext uri="{BB962C8B-B14F-4D97-AF65-F5344CB8AC3E}">
-        <p14:creationId xmlns:p14="http://schemas.microsoft.com/office/powerpoint/2010/main" val="4036109500"/>
+        <p14:creationId xmlns:p14="http://schemas.microsoft.com/office/powerpoint/2010/main" val="3926368428"/>
       </p:ext>
     </p:extLst>
   </p:cSld>
@@ -1854,7 +1855,7 @@
     </p:spTree>
     <p:extLst>
       <p:ext uri="{BB962C8B-B14F-4D97-AF65-F5344CB8AC3E}">
-        <p14:creationId xmlns:p14="http://schemas.microsoft.com/office/powerpoint/2010/main" val="4056452143"/>
+        <p14:creationId xmlns:p14="http://schemas.microsoft.com/office/powerpoint/2010/main" val="4036109500"/>
       </p:ext>
     </p:extLst>
   </p:cSld>
@@ -1963,7 +1964,7 @@
     </p:spTree>
     <p:extLst>
       <p:ext uri="{BB962C8B-B14F-4D97-AF65-F5344CB8AC3E}">
-        <p14:creationId xmlns:p14="http://schemas.microsoft.com/office/powerpoint/2010/main" val="3531987235"/>
+        <p14:creationId xmlns:p14="http://schemas.microsoft.com/office/powerpoint/2010/main" val="4056452143"/>
       </p:ext>
     </p:extLst>
   </p:cSld>
@@ -2197,7 +2198,7 @@
     </p:spTree>
     <p:extLst>
       <p:ext uri="{BB962C8B-B14F-4D97-AF65-F5344CB8AC3E}">
-        <p14:creationId xmlns:p14="http://schemas.microsoft.com/office/powerpoint/2010/main" val="1284591829"/>
+        <p14:creationId xmlns:p14="http://schemas.microsoft.com/office/powerpoint/2010/main" val="3531987235"/>
       </p:ext>
     </p:extLst>
   </p:cSld>
@@ -2306,7 +2307,7 @@
     </p:spTree>
     <p:extLst>
       <p:ext uri="{BB962C8B-B14F-4D97-AF65-F5344CB8AC3E}">
-        <p14:creationId xmlns:p14="http://schemas.microsoft.com/office/powerpoint/2010/main" val="3354959135"/>
+        <p14:creationId xmlns:p14="http://schemas.microsoft.com/office/powerpoint/2010/main" val="1284591829"/>
       </p:ext>
     </p:extLst>
   </p:cSld>
@@ -2415,7 +2416,7 @@
     </p:spTree>
     <p:extLst>
       <p:ext uri="{BB962C8B-B14F-4D97-AF65-F5344CB8AC3E}">
-        <p14:creationId xmlns:p14="http://schemas.microsoft.com/office/powerpoint/2010/main" val="3864249418"/>
+        <p14:creationId xmlns:p14="http://schemas.microsoft.com/office/powerpoint/2010/main" val="3354959135"/>
       </p:ext>
     </p:extLst>
   </p:cSld>
@@ -2524,7 +2525,7 @@
     </p:spTree>
     <p:extLst>
       <p:ext uri="{BB962C8B-B14F-4D97-AF65-F5344CB8AC3E}">
-        <p14:creationId xmlns:p14="http://schemas.microsoft.com/office/powerpoint/2010/main" val="6615638"/>
+        <p14:creationId xmlns:p14="http://schemas.microsoft.com/office/powerpoint/2010/main" val="3864249418"/>
       </p:ext>
     </p:extLst>
   </p:cSld>
@@ -2633,6 +2634,115 @@
     </p:spTree>
     <p:extLst>
       <p:ext uri="{BB962C8B-B14F-4D97-AF65-F5344CB8AC3E}">
+        <p14:creationId xmlns:p14="http://schemas.microsoft.com/office/powerpoint/2010/main" val="6615638"/>
+      </p:ext>
+    </p:extLst>
+  </p:cSld>
+  <p:clrMapOvr>
+    <a:masterClrMapping/>
+  </p:clrMapOvr>
+</p:notes>
+</file>
+
+<file path=ppt/notesSlides/notesSlide25.xml><?xml version="1.0" encoding="utf-8"?>
+<p:notes xmlns:a="http://schemas.openxmlformats.org/drawingml/2006/main" xmlns:r="http://schemas.openxmlformats.org/officeDocument/2006/relationships" xmlns:p="http://schemas.openxmlformats.org/presentationml/2006/main" showMasterSp="0" showMasterPhAnim="0">
+  <p:cSld>
+    <p:spTree>
+      <p:nvGrpSpPr>
+        <p:cNvPr id="1" name="Shape 80"/>
+        <p:cNvGrpSpPr/>
+        <p:nvPr/>
+      </p:nvGrpSpPr>
+      <p:grpSpPr>
+        <a:xfrm>
+          <a:off x="0" y="0"/>
+          <a:ext cx="0" cy="0"/>
+          <a:chOff x="0" y="0"/>
+          <a:chExt cx="0" cy="0"/>
+        </a:xfrm>
+      </p:grpSpPr>
+      <p:sp>
+        <p:nvSpPr>
+          <p:cNvPr id="81" name="Google Shape;81;ga2e8d2e1f6_0_75:notes"/>
+          <p:cNvSpPr>
+            <a:spLocks noGrp="1" noRot="1" noChangeAspect="1"/>
+          </p:cNvSpPr>
+          <p:nvPr>
+            <p:ph type="sldImg" idx="2"/>
+          </p:nvPr>
+        </p:nvSpPr>
+        <p:spPr>
+          <a:xfrm>
+            <a:off x="381000" y="685800"/>
+            <a:ext cx="6096000" cy="3429000"/>
+          </a:xfrm>
+          <a:custGeom>
+            <a:avLst/>
+            <a:gdLst/>
+            <a:ahLst/>
+            <a:cxnLst/>
+            <a:rect l="l" t="t" r="r" b="b"/>
+            <a:pathLst>
+              <a:path w="120000" h="120000" extrusionOk="0">
+                <a:moveTo>
+                  <a:pt x="0" y="0"/>
+                </a:moveTo>
+                <a:lnTo>
+                  <a:pt x="120000" y="0"/>
+                </a:lnTo>
+                <a:lnTo>
+                  <a:pt x="120000" y="120000"/>
+                </a:lnTo>
+                <a:lnTo>
+                  <a:pt x="0" y="120000"/>
+                </a:lnTo>
+                <a:close/>
+              </a:path>
+            </a:pathLst>
+          </a:custGeom>
+        </p:spPr>
+      </p:sp>
+      <p:sp>
+        <p:nvSpPr>
+          <p:cNvPr id="82" name="Google Shape;82;ga2e8d2e1f6_0_75:notes"/>
+          <p:cNvSpPr txBox="1">
+            <a:spLocks noGrp="1"/>
+          </p:cNvSpPr>
+          <p:nvPr>
+            <p:ph type="body" idx="1"/>
+          </p:nvPr>
+        </p:nvSpPr>
+        <p:spPr>
+          <a:xfrm>
+            <a:off x="685800" y="4343400"/>
+            <a:ext cx="5486400" cy="4114800"/>
+          </a:xfrm>
+          <a:prstGeom prst="rect">
+            <a:avLst/>
+          </a:prstGeom>
+        </p:spPr>
+        <p:txBody>
+          <a:bodyPr spcFirstLastPara="1" wrap="square" lIns="91425" tIns="91425" rIns="91425" bIns="91425" anchor="t" anchorCtr="0">
+            <a:noAutofit/>
+          </a:bodyPr>
+          <a:lstStyle/>
+          <a:p>
+            <a:pPr marL="0" lvl="0" indent="0" algn="l" rtl="0">
+              <a:spcBef>
+                <a:spcPts val="0"/>
+              </a:spcBef>
+              <a:spcAft>
+                <a:spcPts val="0"/>
+              </a:spcAft>
+              <a:buNone/>
+            </a:pPr>
+            <a:endParaRPr/>
+          </a:p>
+        </p:txBody>
+      </p:sp>
+    </p:spTree>
+    <p:extLst>
+      <p:ext uri="{BB962C8B-B14F-4D97-AF65-F5344CB8AC3E}">
         <p14:creationId xmlns:p14="http://schemas.microsoft.com/office/powerpoint/2010/main" val="3198619344"/>
       </p:ext>
     </p:extLst>
@@ -2644,6 +2754,110 @@
 </file>
 
 <file path=ppt/notesSlides/notesSlide3.xml><?xml version="1.0" encoding="utf-8"?>
+<p:notes xmlns:a="http://schemas.openxmlformats.org/drawingml/2006/main" xmlns:r="http://schemas.openxmlformats.org/officeDocument/2006/relationships" xmlns:p="http://schemas.openxmlformats.org/presentationml/2006/main" showMasterSp="0" showMasterPhAnim="0">
+  <p:cSld>
+    <p:spTree>
+      <p:nvGrpSpPr>
+        <p:cNvPr id="1" name="Shape 74"/>
+        <p:cNvGrpSpPr/>
+        <p:nvPr/>
+      </p:nvGrpSpPr>
+      <p:grpSpPr>
+        <a:xfrm>
+          <a:off x="0" y="0"/>
+          <a:ext cx="0" cy="0"/>
+          <a:chOff x="0" y="0"/>
+          <a:chExt cx="0" cy="0"/>
+        </a:xfrm>
+      </p:grpSpPr>
+      <p:sp>
+        <p:nvSpPr>
+          <p:cNvPr id="75" name="Google Shape;75;ga2e8d2e1f6_0_20:notes"/>
+          <p:cNvSpPr>
+            <a:spLocks noGrp="1" noRot="1" noChangeAspect="1"/>
+          </p:cNvSpPr>
+          <p:nvPr>
+            <p:ph type="sldImg" idx="2"/>
+          </p:nvPr>
+        </p:nvSpPr>
+        <p:spPr>
+          <a:xfrm>
+            <a:off x="381000" y="685800"/>
+            <a:ext cx="6096000" cy="3429000"/>
+          </a:xfrm>
+          <a:custGeom>
+            <a:avLst/>
+            <a:gdLst/>
+            <a:ahLst/>
+            <a:cxnLst/>
+            <a:rect l="l" t="t" r="r" b="b"/>
+            <a:pathLst>
+              <a:path w="120000" h="120000" extrusionOk="0">
+                <a:moveTo>
+                  <a:pt x="0" y="0"/>
+                </a:moveTo>
+                <a:lnTo>
+                  <a:pt x="120000" y="0"/>
+                </a:lnTo>
+                <a:lnTo>
+                  <a:pt x="120000" y="120000"/>
+                </a:lnTo>
+                <a:lnTo>
+                  <a:pt x="0" y="120000"/>
+                </a:lnTo>
+                <a:close/>
+              </a:path>
+            </a:pathLst>
+          </a:custGeom>
+        </p:spPr>
+      </p:sp>
+      <p:sp>
+        <p:nvSpPr>
+          <p:cNvPr id="76" name="Google Shape;76;ga2e8d2e1f6_0_20:notes"/>
+          <p:cNvSpPr txBox="1">
+            <a:spLocks noGrp="1"/>
+          </p:cNvSpPr>
+          <p:nvPr>
+            <p:ph type="body" idx="1"/>
+          </p:nvPr>
+        </p:nvSpPr>
+        <p:spPr>
+          <a:xfrm>
+            <a:off x="685800" y="4343400"/>
+            <a:ext cx="5486400" cy="4114800"/>
+          </a:xfrm>
+          <a:prstGeom prst="rect">
+            <a:avLst/>
+          </a:prstGeom>
+        </p:spPr>
+        <p:txBody>
+          <a:bodyPr spcFirstLastPara="1" wrap="square" lIns="91425" tIns="91425" rIns="91425" bIns="91425" anchor="t" anchorCtr="0">
+            <a:noAutofit/>
+          </a:bodyPr>
+          <a:lstStyle/>
+          <a:p>
+            <a:pPr marL="0" lvl="0" indent="0" algn="l" rtl="0">
+              <a:spcBef>
+                <a:spcPts val="0"/>
+              </a:spcBef>
+              <a:spcAft>
+                <a:spcPts val="0"/>
+              </a:spcAft>
+              <a:buNone/>
+            </a:pPr>
+            <a:endParaRPr/>
+          </a:p>
+        </p:txBody>
+      </p:sp>
+    </p:spTree>
+  </p:cSld>
+  <p:clrMapOvr>
+    <a:masterClrMapping/>
+  </p:clrMapOvr>
+</p:notes>
+</file>
+
+<file path=ppt/notesSlides/notesSlide4.xml><?xml version="1.0" encoding="utf-8"?>
 <p:notes xmlns:a="http://schemas.openxmlformats.org/drawingml/2006/main" xmlns:r="http://schemas.openxmlformats.org/officeDocument/2006/relationships" xmlns:p="http://schemas.openxmlformats.org/presentationml/2006/main" showMasterSp="0" showMasterPhAnim="0">
   <p:cSld>
     <p:spTree>
@@ -2747,7 +2961,7 @@
 </p:notes>
 </file>
 
-<file path=ppt/notesSlides/notesSlide4.xml><?xml version="1.0" encoding="utf-8"?>
+<file path=ppt/notesSlides/notesSlide5.xml><?xml version="1.0" encoding="utf-8"?>
 <p:notes xmlns:a="http://schemas.openxmlformats.org/drawingml/2006/main" xmlns:r="http://schemas.openxmlformats.org/officeDocument/2006/relationships" xmlns:p="http://schemas.openxmlformats.org/presentationml/2006/main" showMasterSp="0" showMasterPhAnim="0">
   <p:cSld>
     <p:spTree>
@@ -2844,110 +3058,11 @@
         </p:txBody>
       </p:sp>
     </p:spTree>
-  </p:cSld>
-  <p:clrMapOvr>
-    <a:masterClrMapping/>
-  </p:clrMapOvr>
-</p:notes>
-</file>
-
-<file path=ppt/notesSlides/notesSlide5.xml><?xml version="1.0" encoding="utf-8"?>
-<p:notes xmlns:a="http://schemas.openxmlformats.org/drawingml/2006/main" xmlns:r="http://schemas.openxmlformats.org/officeDocument/2006/relationships" xmlns:p="http://schemas.openxmlformats.org/presentationml/2006/main" showMasterSp="0" showMasterPhAnim="0">
-  <p:cSld>
-    <p:spTree>
-      <p:nvGrpSpPr>
-        <p:cNvPr id="1" name="Shape 80"/>
-        <p:cNvGrpSpPr/>
-        <p:nvPr/>
-      </p:nvGrpSpPr>
-      <p:grpSpPr>
-        <a:xfrm>
-          <a:off x="0" y="0"/>
-          <a:ext cx="0" cy="0"/>
-          <a:chOff x="0" y="0"/>
-          <a:chExt cx="0" cy="0"/>
-        </a:xfrm>
-      </p:grpSpPr>
-      <p:sp>
-        <p:nvSpPr>
-          <p:cNvPr id="81" name="Google Shape;81;ga2e8d2e1f6_0_75:notes"/>
-          <p:cNvSpPr>
-            <a:spLocks noGrp="1" noRot="1" noChangeAspect="1"/>
-          </p:cNvSpPr>
-          <p:nvPr>
-            <p:ph type="sldImg" idx="2"/>
-          </p:nvPr>
-        </p:nvSpPr>
-        <p:spPr>
-          <a:xfrm>
-            <a:off x="381000" y="685800"/>
-            <a:ext cx="6096000" cy="3429000"/>
-          </a:xfrm>
-          <a:custGeom>
-            <a:avLst/>
-            <a:gdLst/>
-            <a:ahLst/>
-            <a:cxnLst/>
-            <a:rect l="l" t="t" r="r" b="b"/>
-            <a:pathLst>
-              <a:path w="120000" h="120000" extrusionOk="0">
-                <a:moveTo>
-                  <a:pt x="0" y="0"/>
-                </a:moveTo>
-                <a:lnTo>
-                  <a:pt x="120000" y="0"/>
-                </a:lnTo>
-                <a:lnTo>
-                  <a:pt x="120000" y="120000"/>
-                </a:lnTo>
-                <a:lnTo>
-                  <a:pt x="0" y="120000"/>
-                </a:lnTo>
-                <a:close/>
-              </a:path>
-            </a:pathLst>
-          </a:custGeom>
-        </p:spPr>
-      </p:sp>
-      <p:sp>
-        <p:nvSpPr>
-          <p:cNvPr id="82" name="Google Shape;82;ga2e8d2e1f6_0_75:notes"/>
-          <p:cNvSpPr txBox="1">
-            <a:spLocks noGrp="1"/>
-          </p:cNvSpPr>
-          <p:nvPr>
-            <p:ph type="body" idx="1"/>
-          </p:nvPr>
-        </p:nvSpPr>
-        <p:spPr>
-          <a:xfrm>
-            <a:off x="685800" y="4343400"/>
-            <a:ext cx="5486400" cy="4114800"/>
-          </a:xfrm>
-          <a:prstGeom prst="rect">
-            <a:avLst/>
-          </a:prstGeom>
-        </p:spPr>
-        <p:txBody>
-          <a:bodyPr spcFirstLastPara="1" wrap="square" lIns="91425" tIns="91425" rIns="91425" bIns="91425" anchor="t" anchorCtr="0">
-            <a:noAutofit/>
-          </a:bodyPr>
-          <a:lstStyle/>
-          <a:p>
-            <a:pPr marL="0" lvl="0" indent="0" algn="l" rtl="0">
-              <a:spcBef>
-                <a:spcPts val="0"/>
-              </a:spcBef>
-              <a:spcAft>
-                <a:spcPts val="0"/>
-              </a:spcAft>
-              <a:buNone/>
-            </a:pPr>
-            <a:endParaRPr/>
-          </a:p>
-        </p:txBody>
-      </p:sp>
-    </p:spTree>
+    <p:extLst>
+      <p:ext uri="{BB962C8B-B14F-4D97-AF65-F5344CB8AC3E}">
+        <p14:creationId xmlns:p14="http://schemas.microsoft.com/office/powerpoint/2010/main" val="2673306886"/>
+      </p:ext>
+    </p:extLst>
   </p:cSld>
   <p:clrMapOvr>
     <a:masterClrMapping/>
@@ -3052,11 +3167,6 @@
         </p:txBody>
       </p:sp>
     </p:spTree>
-    <p:extLst>
-      <p:ext uri="{BB962C8B-B14F-4D97-AF65-F5344CB8AC3E}">
-        <p14:creationId xmlns:p14="http://schemas.microsoft.com/office/powerpoint/2010/main" val="974409297"/>
-      </p:ext>
-    </p:extLst>
   </p:cSld>
   <p:clrMapOvr>
     <a:masterClrMapping/>
@@ -3163,7 +3273,7 @@
     </p:spTree>
     <p:extLst>
       <p:ext uri="{BB962C8B-B14F-4D97-AF65-F5344CB8AC3E}">
-        <p14:creationId xmlns:p14="http://schemas.microsoft.com/office/powerpoint/2010/main" val="801243526"/>
+        <p14:creationId xmlns:p14="http://schemas.microsoft.com/office/powerpoint/2010/main" val="974409297"/>
       </p:ext>
     </p:extLst>
   </p:cSld>
@@ -3272,7 +3382,7 @@
     </p:spTree>
     <p:extLst>
       <p:ext uri="{BB962C8B-B14F-4D97-AF65-F5344CB8AC3E}">
-        <p14:creationId xmlns:p14="http://schemas.microsoft.com/office/powerpoint/2010/main" val="4134617096"/>
+        <p14:creationId xmlns:p14="http://schemas.microsoft.com/office/powerpoint/2010/main" val="801243526"/>
       </p:ext>
     </p:extLst>
   </p:cSld>
@@ -3381,7 +3491,7 @@
     </p:spTree>
     <p:extLst>
       <p:ext uri="{BB962C8B-B14F-4D97-AF65-F5344CB8AC3E}">
-        <p14:creationId xmlns:p14="http://schemas.microsoft.com/office/powerpoint/2010/main" val="2935618172"/>
+        <p14:creationId xmlns:p14="http://schemas.microsoft.com/office/powerpoint/2010/main" val="4134617096"/>
       </p:ext>
     </p:extLst>
   </p:cSld>
@@ -8193,7 +8303,7 @@
             </a:pPr>
             <a:r>
               <a:rPr lang="en" b="1" dirty="0"/>
-              <a:t>Program Name goes here</a:t>
+              <a:t>Rock Paper Scissors</a:t>
             </a:r>
             <a:endParaRPr b="1" dirty="0"/>
           </a:p>
@@ -8331,7 +8441,7 @@
                 </a:solidFill>
                 <a:hlinkClick r:id="rId4"/>
               </a:rPr>
-              <a:t>https://trello.com/invite/b/BgZrU1WW/b9c75da7ce5d0ced0523cfc8278e5f93/lucky-unicorn</a:t>
+              <a:t>https://trello.com/invite/b/PftMeSlF/38189a196ae3729b0c1647bf8fc08002/rock-paper-scissors</a:t>
             </a:r>
             <a:r>
               <a:rPr lang="en-NZ" sz="1400" b="1" dirty="0">
@@ -8340,14 +8450,6 @@
                 </a:solidFill>
               </a:rPr>
               <a:t> </a:t>
-            </a:r>
-            <a:r>
-              <a:rPr lang="en" sz="1400" b="1" dirty="0">
-                <a:solidFill>
-                  <a:srgbClr val="274E13"/>
-                </a:solidFill>
-              </a:rPr>
-              <a:t> </a:t>
             </a:r>
             <a:endParaRPr lang="en-US" sz="2000" dirty="0"/>
           </a:p>
@@ -8441,6 +8543,150 @@
   <p:cSld>
     <p:spTree>
       <p:nvGrpSpPr>
+        <p:cNvPr id="1" name="Shape 83"/>
+        <p:cNvGrpSpPr/>
+        <p:nvPr/>
+      </p:nvGrpSpPr>
+      <p:grpSpPr>
+        <a:xfrm>
+          <a:off x="0" y="0"/>
+          <a:ext cx="0" cy="0"/>
+          <a:chOff x="0" y="0"/>
+          <a:chExt cx="0" cy="0"/>
+        </a:xfrm>
+      </p:grpSpPr>
+      <p:sp>
+        <p:nvSpPr>
+          <p:cNvPr id="84" name="Google Shape;84;p18"/>
+          <p:cNvSpPr txBox="1">
+            <a:spLocks noGrp="1"/>
+          </p:cNvSpPr>
+          <p:nvPr>
+            <p:ph type="title"/>
+          </p:nvPr>
+        </p:nvSpPr>
+        <p:spPr>
+          <a:xfrm>
+            <a:off x="311700" y="445025"/>
+            <a:ext cx="8520600" cy="572700"/>
+          </a:xfrm>
+          <a:prstGeom prst="rect">
+            <a:avLst/>
+          </a:prstGeom>
+        </p:spPr>
+        <p:txBody>
+          <a:bodyPr spcFirstLastPara="1" wrap="square" lIns="91425" tIns="91425" rIns="91425" bIns="91425" anchor="t" anchorCtr="0">
+            <a:noAutofit/>
+          </a:bodyPr>
+          <a:lstStyle/>
+          <a:p>
+            <a:pPr marL="0" lvl="0" indent="0" algn="l" rtl="0">
+              <a:spcBef>
+                <a:spcPts val="0"/>
+              </a:spcBef>
+              <a:spcAft>
+                <a:spcPts val="0"/>
+              </a:spcAft>
+              <a:buNone/>
+            </a:pPr>
+            <a:r>
+              <a:rPr lang="en" b="1" dirty="0"/>
+              <a:t>How Much? (Ask for user input)</a:t>
+            </a:r>
+            <a:endParaRPr b="1" dirty="0"/>
+          </a:p>
+        </p:txBody>
+      </p:sp>
+      <p:sp>
+        <p:nvSpPr>
+          <p:cNvPr id="85" name="Google Shape;85;p18"/>
+          <p:cNvSpPr txBox="1">
+            <a:spLocks noGrp="1"/>
+          </p:cNvSpPr>
+          <p:nvPr>
+            <p:ph type="body" idx="1"/>
+          </p:nvPr>
+        </p:nvSpPr>
+        <p:spPr>
+          <a:xfrm>
+            <a:off x="311699" y="1152475"/>
+            <a:ext cx="3862735" cy="3416400"/>
+          </a:xfrm>
+          <a:prstGeom prst="rect">
+            <a:avLst/>
+          </a:prstGeom>
+        </p:spPr>
+        <p:txBody>
+          <a:bodyPr spcFirstLastPara="1" wrap="square" lIns="91425" tIns="91425" rIns="91425" bIns="91425" anchor="t" anchorCtr="0">
+            <a:noAutofit/>
+          </a:bodyPr>
+          <a:lstStyle/>
+          <a:p>
+            <a:pPr marL="0" lvl="0" indent="0" algn="l" rtl="0">
+              <a:spcBef>
+                <a:spcPts val="0"/>
+              </a:spcBef>
+              <a:spcAft>
+                <a:spcPts val="1600"/>
+              </a:spcAft>
+              <a:buNone/>
+            </a:pPr>
+            <a:r>
+              <a:rPr lang="en" i="1" dirty="0"/>
+              <a:t>The plan is to develop a number checking function as part of this component. </a:t>
+            </a:r>
+            <a:endParaRPr i="1" dirty="0"/>
+          </a:p>
+        </p:txBody>
+      </p:sp>
+      <p:pic>
+        <p:nvPicPr>
+          <p:cNvPr id="4" name="Picture 3">
+            <a:extLst>
+              <a:ext uri="{FF2B5EF4-FFF2-40B4-BE49-F238E27FC236}">
+                <a16:creationId xmlns:a16="http://schemas.microsoft.com/office/drawing/2014/main" id="{4DA01C25-380E-4BFC-B554-48EFA4E33AC7}"/>
+              </a:ext>
+            </a:extLst>
+          </p:cNvPr>
+          <p:cNvPicPr>
+            <a:picLocks noChangeAspect="1"/>
+          </p:cNvPicPr>
+          <p:nvPr/>
+        </p:nvPicPr>
+        <p:blipFill>
+          <a:blip r:embed="rId3"/>
+          <a:stretch>
+            <a:fillRect/>
+          </a:stretch>
+        </p:blipFill>
+        <p:spPr>
+          <a:xfrm>
+            <a:off x="4572000" y="1222441"/>
+            <a:ext cx="3717462" cy="3416400"/>
+          </a:xfrm>
+          <a:prstGeom prst="rect">
+            <a:avLst/>
+          </a:prstGeom>
+        </p:spPr>
+      </p:pic>
+    </p:spTree>
+    <p:extLst>
+      <p:ext uri="{BB962C8B-B14F-4D97-AF65-F5344CB8AC3E}">
+        <p14:creationId xmlns:p14="http://schemas.microsoft.com/office/powerpoint/2010/main" val="359406329"/>
+      </p:ext>
+    </p:extLst>
+  </p:cSld>
+  <p:clrMapOvr>
+    <a:masterClrMapping/>
+  </p:clrMapOvr>
+</p:sld>
+</file>
+
+<file path=ppt/slides/slide11.xml><?xml version="1.0" encoding="utf-8"?>
+<p:sld xmlns:a="http://schemas.openxmlformats.org/drawingml/2006/main" xmlns:r="http://schemas.openxmlformats.org/officeDocument/2006/relationships" xmlns:p="http://schemas.openxmlformats.org/presentationml/2006/main">
+  <p:cSld>
+    <p:spTree>
+      <p:nvGrpSpPr>
         <p:cNvPr id="1" name=""/>
         <p:cNvGrpSpPr/>
         <p:nvPr/>
@@ -8525,7 +8771,7 @@
 </p:sld>
 </file>
 
-<file path=ppt/slides/slide11.xml><?xml version="1.0" encoding="utf-8"?>
+<file path=ppt/slides/slide12.xml><?xml version="1.0" encoding="utf-8"?>
 <p:sld xmlns:a="http://schemas.openxmlformats.org/drawingml/2006/main" xmlns:r="http://schemas.openxmlformats.org/officeDocument/2006/relationships" xmlns:p="http://schemas.openxmlformats.org/presentationml/2006/main">
   <p:cSld>
     <p:spTree>
@@ -8662,7 +8908,7 @@
 </p:sld>
 </file>
 
-<file path=ppt/slides/slide12.xml><?xml version="1.0" encoding="utf-8"?>
+<file path=ppt/slides/slide13.xml><?xml version="1.0" encoding="utf-8"?>
 <p:sld xmlns:a="http://schemas.openxmlformats.org/drawingml/2006/main" xmlns:r="http://schemas.openxmlformats.org/officeDocument/2006/relationships" xmlns:p="http://schemas.openxmlformats.org/presentationml/2006/main">
   <p:cSld>
     <p:spTree>
@@ -8870,7 +9116,7 @@
 </p:sld>
 </file>
 
-<file path=ppt/slides/slide13.xml><?xml version="1.0" encoding="utf-8"?>
+<file path=ppt/slides/slide14.xml><?xml version="1.0" encoding="utf-8"?>
 <p:sld xmlns:a="http://schemas.openxmlformats.org/drawingml/2006/main" xmlns:r="http://schemas.openxmlformats.org/officeDocument/2006/relationships" xmlns:p="http://schemas.openxmlformats.org/presentationml/2006/main">
   <p:cSld>
     <p:spTree>
@@ -9194,7 +9440,7 @@
 </p:sld>
 </file>
 
-<file path=ppt/slides/slide14.xml><?xml version="1.0" encoding="utf-8"?>
+<file path=ppt/slides/slide15.xml><?xml version="1.0" encoding="utf-8"?>
 <p:sld xmlns:a="http://schemas.openxmlformats.org/drawingml/2006/main" xmlns:r="http://schemas.openxmlformats.org/officeDocument/2006/relationships" xmlns:p="http://schemas.openxmlformats.org/presentationml/2006/main">
   <p:cSld>
     <p:spTree>
@@ -9710,7 +9956,7 @@
 </p:sld>
 </file>
 
-<file path=ppt/slides/slide15.xml><?xml version="1.0" encoding="utf-8"?>
+<file path=ppt/slides/slide16.xml><?xml version="1.0" encoding="utf-8"?>
 <p:sld xmlns:a="http://schemas.openxmlformats.org/drawingml/2006/main" xmlns:r="http://schemas.openxmlformats.org/officeDocument/2006/relationships" xmlns:p="http://schemas.openxmlformats.org/presentationml/2006/main">
   <p:cSld>
     <p:spTree>
@@ -9891,7 +10137,7 @@
 </p:sld>
 </file>
 
-<file path=ppt/slides/slide16.xml><?xml version="1.0" encoding="utf-8"?>
+<file path=ppt/slides/slide17.xml><?xml version="1.0" encoding="utf-8"?>
 <p:sld xmlns:a="http://schemas.openxmlformats.org/drawingml/2006/main" xmlns:r="http://schemas.openxmlformats.org/officeDocument/2006/relationships" xmlns:p="http://schemas.openxmlformats.org/presentationml/2006/main">
   <p:cSld>
     <p:spTree>
@@ -10039,7 +10285,7 @@
 </p:sld>
 </file>
 
-<file path=ppt/slides/slide17.xml><?xml version="1.0" encoding="utf-8"?>
+<file path=ppt/slides/slide18.xml><?xml version="1.0" encoding="utf-8"?>
 <p:sld xmlns:a="http://schemas.openxmlformats.org/drawingml/2006/main" xmlns:r="http://schemas.openxmlformats.org/officeDocument/2006/relationships" xmlns:p="http://schemas.openxmlformats.org/presentationml/2006/main">
   <p:cSld>
     <p:spTree>
@@ -10314,7 +10560,7 @@
 </p:sld>
 </file>
 
-<file path=ppt/slides/slide18.xml><?xml version="1.0" encoding="utf-8"?>
+<file path=ppt/slides/slide19.xml><?xml version="1.0" encoding="utf-8"?>
 <p:sld xmlns:a="http://schemas.openxmlformats.org/drawingml/2006/main" xmlns:r="http://schemas.openxmlformats.org/officeDocument/2006/relationships" xmlns:p="http://schemas.openxmlformats.org/presentationml/2006/main">
   <p:cSld>
     <p:spTree>
@@ -10558,7 +10804,112 @@
 </p:sld>
 </file>
 
-<file path=ppt/slides/slide19.xml><?xml version="1.0" encoding="utf-8"?>
+<file path=ppt/slides/slide2.xml><?xml version="1.0" encoding="utf-8"?>
+<p:sld xmlns:a="http://schemas.openxmlformats.org/drawingml/2006/main" xmlns:r="http://schemas.openxmlformats.org/officeDocument/2006/relationships" xmlns:p="http://schemas.openxmlformats.org/presentationml/2006/main">
+  <p:cSld>
+    <p:bg>
+      <p:bgPr>
+        <a:solidFill>
+          <a:srgbClr val="D9EAD3"/>
+        </a:solidFill>
+        <a:effectLst/>
+      </p:bgPr>
+    </p:bg>
+    <p:spTree>
+      <p:nvGrpSpPr>
+        <p:cNvPr id="1" name="Shape 66"/>
+        <p:cNvGrpSpPr/>
+        <p:nvPr/>
+      </p:nvGrpSpPr>
+      <p:grpSpPr>
+        <a:xfrm>
+          <a:off x="0" y="0"/>
+          <a:ext cx="0" cy="0"/>
+          <a:chOff x="0" y="0"/>
+          <a:chExt cx="0" cy="0"/>
+        </a:xfrm>
+      </p:grpSpPr>
+      <p:sp>
+        <p:nvSpPr>
+          <p:cNvPr id="67" name="Google Shape;67;p15"/>
+          <p:cNvSpPr txBox="1">
+            <a:spLocks noGrp="1"/>
+          </p:cNvSpPr>
+          <p:nvPr>
+            <p:ph type="title"/>
+          </p:nvPr>
+        </p:nvSpPr>
+        <p:spPr>
+          <a:xfrm>
+            <a:off x="311700" y="445025"/>
+            <a:ext cx="8520600" cy="572700"/>
+          </a:xfrm>
+          <a:prstGeom prst="rect">
+            <a:avLst/>
+          </a:prstGeom>
+        </p:spPr>
+        <p:txBody>
+          <a:bodyPr spcFirstLastPara="1" wrap="square" lIns="91425" tIns="91425" rIns="91425" bIns="91425" anchor="t" anchorCtr="0">
+            <a:noAutofit/>
+          </a:bodyPr>
+          <a:lstStyle/>
+          <a:p>
+            <a:pPr marL="0" lvl="0" indent="0" algn="l" rtl="0">
+              <a:spcBef>
+                <a:spcPts val="0"/>
+              </a:spcBef>
+              <a:spcAft>
+                <a:spcPts val="0"/>
+              </a:spcAft>
+              <a:buNone/>
+            </a:pPr>
+            <a:r>
+              <a:rPr lang="en" b="1" dirty="0"/>
+              <a:t>Decomposition</a:t>
+            </a:r>
+            <a:endParaRPr b="1" dirty="0"/>
+          </a:p>
+        </p:txBody>
+      </p:sp>
+      <p:pic>
+        <p:nvPicPr>
+          <p:cNvPr id="2" name="Picture 1">
+            <a:extLst>
+              <a:ext uri="{FF2B5EF4-FFF2-40B4-BE49-F238E27FC236}">
+                <a16:creationId xmlns:a16="http://schemas.microsoft.com/office/drawing/2014/main" id="{B89EF260-77D9-4233-8AB5-57CEACD591F9}"/>
+              </a:ext>
+            </a:extLst>
+          </p:cNvPr>
+          <p:cNvPicPr>
+            <a:picLocks noChangeAspect="1"/>
+          </p:cNvPicPr>
+          <p:nvPr/>
+        </p:nvPicPr>
+        <p:blipFill>
+          <a:blip r:embed="rId3"/>
+          <a:stretch>
+            <a:fillRect/>
+          </a:stretch>
+        </p:blipFill>
+        <p:spPr>
+          <a:xfrm>
+            <a:off x="514779" y="1144283"/>
+            <a:ext cx="2052421" cy="3554192"/>
+          </a:xfrm>
+          <a:prstGeom prst="rect">
+            <a:avLst/>
+          </a:prstGeom>
+        </p:spPr>
+      </p:pic>
+    </p:spTree>
+  </p:cSld>
+  <p:clrMapOvr>
+    <a:masterClrMapping/>
+  </p:clrMapOvr>
+</p:sld>
+</file>
+
+<file path=ppt/slides/slide20.xml><?xml version="1.0" encoding="utf-8"?>
 <p:sld xmlns:a="http://schemas.openxmlformats.org/drawingml/2006/main" xmlns:r="http://schemas.openxmlformats.org/officeDocument/2006/relationships" xmlns:p="http://schemas.openxmlformats.org/presentationml/2006/main">
   <p:cSld>
     <p:spTree>
@@ -10709,112 +11060,7 @@
 </p:sld>
 </file>
 
-<file path=ppt/slides/slide2.xml><?xml version="1.0" encoding="utf-8"?>
-<p:sld xmlns:a="http://schemas.openxmlformats.org/drawingml/2006/main" xmlns:r="http://schemas.openxmlformats.org/officeDocument/2006/relationships" xmlns:p="http://schemas.openxmlformats.org/presentationml/2006/main">
-  <p:cSld>
-    <p:bg>
-      <p:bgPr>
-        <a:solidFill>
-          <a:srgbClr val="D9EAD3"/>
-        </a:solidFill>
-        <a:effectLst/>
-      </p:bgPr>
-    </p:bg>
-    <p:spTree>
-      <p:nvGrpSpPr>
-        <p:cNvPr id="1" name="Shape 66"/>
-        <p:cNvGrpSpPr/>
-        <p:nvPr/>
-      </p:nvGrpSpPr>
-      <p:grpSpPr>
-        <a:xfrm>
-          <a:off x="0" y="0"/>
-          <a:ext cx="0" cy="0"/>
-          <a:chOff x="0" y="0"/>
-          <a:chExt cx="0" cy="0"/>
-        </a:xfrm>
-      </p:grpSpPr>
-      <p:sp>
-        <p:nvSpPr>
-          <p:cNvPr id="67" name="Google Shape;67;p15"/>
-          <p:cNvSpPr txBox="1">
-            <a:spLocks noGrp="1"/>
-          </p:cNvSpPr>
-          <p:nvPr>
-            <p:ph type="title"/>
-          </p:nvPr>
-        </p:nvSpPr>
-        <p:spPr>
-          <a:xfrm>
-            <a:off x="311700" y="445025"/>
-            <a:ext cx="8520600" cy="572700"/>
-          </a:xfrm>
-          <a:prstGeom prst="rect">
-            <a:avLst/>
-          </a:prstGeom>
-        </p:spPr>
-        <p:txBody>
-          <a:bodyPr spcFirstLastPara="1" wrap="square" lIns="91425" tIns="91425" rIns="91425" bIns="91425" anchor="t" anchorCtr="0">
-            <a:noAutofit/>
-          </a:bodyPr>
-          <a:lstStyle/>
-          <a:p>
-            <a:pPr marL="0" lvl="0" indent="0" algn="l" rtl="0">
-              <a:spcBef>
-                <a:spcPts val="0"/>
-              </a:spcBef>
-              <a:spcAft>
-                <a:spcPts val="0"/>
-              </a:spcAft>
-              <a:buNone/>
-            </a:pPr>
-            <a:r>
-              <a:rPr lang="en" b="1" dirty="0"/>
-              <a:t>Decomposition</a:t>
-            </a:r>
-            <a:endParaRPr b="1" dirty="0"/>
-          </a:p>
-        </p:txBody>
-      </p:sp>
-      <p:pic>
-        <p:nvPicPr>
-          <p:cNvPr id="3" name="Picture 2">
-            <a:extLst>
-              <a:ext uri="{FF2B5EF4-FFF2-40B4-BE49-F238E27FC236}">
-                <a16:creationId xmlns:a16="http://schemas.microsoft.com/office/drawing/2014/main" id="{C8093CC5-407E-44B1-9B73-7F2D5456BF0A}"/>
-              </a:ext>
-            </a:extLst>
-          </p:cNvPr>
-          <p:cNvPicPr>
-            <a:picLocks noChangeAspect="1"/>
-          </p:cNvPicPr>
-          <p:nvPr/>
-        </p:nvPicPr>
-        <p:blipFill>
-          <a:blip r:embed="rId3"/>
-          <a:stretch>
-            <a:fillRect/>
-          </a:stretch>
-        </p:blipFill>
-        <p:spPr>
-          <a:xfrm>
-            <a:off x="386419" y="1155175"/>
-            <a:ext cx="2085975" cy="3543300"/>
-          </a:xfrm>
-          <a:prstGeom prst="rect">
-            <a:avLst/>
-          </a:prstGeom>
-        </p:spPr>
-      </p:pic>
-    </p:spTree>
-  </p:cSld>
-  <p:clrMapOvr>
-    <a:masterClrMapping/>
-  </p:clrMapOvr>
-</p:sld>
-</file>
-
-<file path=ppt/slides/slide20.xml><?xml version="1.0" encoding="utf-8"?>
+<file path=ppt/slides/slide21.xml><?xml version="1.0" encoding="utf-8"?>
 <p:sld xmlns:a="http://schemas.openxmlformats.org/drawingml/2006/main" xmlns:r="http://schemas.openxmlformats.org/officeDocument/2006/relationships" xmlns:p="http://schemas.openxmlformats.org/presentationml/2006/main">
   <p:cSld>
     <p:spTree>
@@ -11064,7 +11310,7 @@
 </p:sld>
 </file>
 
-<file path=ppt/slides/slide21.xml><?xml version="1.0" encoding="utf-8"?>
+<file path=ppt/slides/slide22.xml><?xml version="1.0" encoding="utf-8"?>
 <p:sld xmlns:a="http://schemas.openxmlformats.org/drawingml/2006/main" xmlns:r="http://schemas.openxmlformats.org/officeDocument/2006/relationships" xmlns:p="http://schemas.openxmlformats.org/presentationml/2006/main">
   <p:cSld>
     <p:spTree>
@@ -11332,7 +11578,7 @@
 </p:sld>
 </file>
 
-<file path=ppt/slides/slide22.xml><?xml version="1.0" encoding="utf-8"?>
+<file path=ppt/slides/slide23.xml><?xml version="1.0" encoding="utf-8"?>
 <p:sld xmlns:a="http://schemas.openxmlformats.org/drawingml/2006/main" xmlns:r="http://schemas.openxmlformats.org/officeDocument/2006/relationships" xmlns:p="http://schemas.openxmlformats.org/presentationml/2006/main">
   <p:cSld>
     <p:spTree>
@@ -11585,7 +11831,7 @@
 </p:sld>
 </file>
 
-<file path=ppt/slides/slide23.xml><?xml version="1.0" encoding="utf-8"?>
+<file path=ppt/slides/slide24.xml><?xml version="1.0" encoding="utf-8"?>
 <p:sld xmlns:a="http://schemas.openxmlformats.org/drawingml/2006/main" xmlns:r="http://schemas.openxmlformats.org/officeDocument/2006/relationships" xmlns:p="http://schemas.openxmlformats.org/presentationml/2006/main">
   <p:cSld>
     <p:spTree>
@@ -11717,7 +11963,7 @@
 </p:sld>
 </file>
 
-<file path=ppt/slides/slide24.xml><?xml version="1.0" encoding="utf-8"?>
+<file path=ppt/slides/slide25.xml><?xml version="1.0" encoding="utf-8"?>
 <p:sld xmlns:a="http://schemas.openxmlformats.org/drawingml/2006/main" xmlns:r="http://schemas.openxmlformats.org/officeDocument/2006/relationships" xmlns:p="http://schemas.openxmlformats.org/presentationml/2006/main">
   <p:cSld>
     <p:spTree>
@@ -11849,7 +12095,7 @@
 </p:sld>
 </file>
 
-<file path=ppt/slides/slide25.xml><?xml version="1.0" encoding="utf-8"?>
+<file path=ppt/slides/slide26.xml><?xml version="1.0" encoding="utf-8"?>
 <p:sld xmlns:a="http://schemas.openxmlformats.org/drawingml/2006/main" xmlns:r="http://schemas.openxmlformats.org/officeDocument/2006/relationships" xmlns:p="http://schemas.openxmlformats.org/presentationml/2006/main">
   <p:cSld>
     <p:spTree>
@@ -11981,149 +12227,6 @@
 </p:sld>
 </file>
 
-<file path=ppt/slides/slide26.xml><?xml version="1.0" encoding="utf-8"?>
-<p:sld xmlns:a="http://schemas.openxmlformats.org/drawingml/2006/main" xmlns:r="http://schemas.openxmlformats.org/officeDocument/2006/relationships" xmlns:p="http://schemas.openxmlformats.org/presentationml/2006/main">
-  <p:cSld>
-    <p:spTree>
-      <p:nvGrpSpPr>
-        <p:cNvPr id="1" name="Shape 83"/>
-        <p:cNvGrpSpPr/>
-        <p:nvPr/>
-      </p:nvGrpSpPr>
-      <p:grpSpPr>
-        <a:xfrm>
-          <a:off x="0" y="0"/>
-          <a:ext cx="0" cy="0"/>
-          <a:chOff x="0" y="0"/>
-          <a:chExt cx="0" cy="0"/>
-        </a:xfrm>
-      </p:grpSpPr>
-      <p:sp>
-        <p:nvSpPr>
-          <p:cNvPr id="84" name="Google Shape;84;p18"/>
-          <p:cNvSpPr txBox="1">
-            <a:spLocks noGrp="1"/>
-          </p:cNvSpPr>
-          <p:nvPr>
-            <p:ph type="title"/>
-          </p:nvPr>
-        </p:nvSpPr>
-        <p:spPr>
-          <a:xfrm>
-            <a:off x="311700" y="445025"/>
-            <a:ext cx="8520600" cy="572700"/>
-          </a:xfrm>
-          <a:prstGeom prst="rect">
-            <a:avLst/>
-          </a:prstGeom>
-        </p:spPr>
-        <p:txBody>
-          <a:bodyPr spcFirstLastPara="1" wrap="square" lIns="91425" tIns="91425" rIns="91425" bIns="91425" anchor="t" anchorCtr="0">
-            <a:noAutofit/>
-          </a:bodyPr>
-          <a:lstStyle/>
-          <a:p>
-            <a:pPr marL="0" lvl="0" indent="0" algn="l" rtl="0">
-              <a:spcBef>
-                <a:spcPts val="0"/>
-              </a:spcBef>
-              <a:spcAft>
-                <a:spcPts val="0"/>
-              </a:spcAft>
-              <a:buNone/>
-            </a:pPr>
-            <a:r>
-              <a:rPr lang="en" b="1" dirty="0"/>
-              <a:t>Addressing Relevant Implications</a:t>
-            </a:r>
-            <a:endParaRPr b="1" dirty="0"/>
-          </a:p>
-        </p:txBody>
-      </p:sp>
-      <p:sp>
-        <p:nvSpPr>
-          <p:cNvPr id="85" name="Google Shape;85;p18"/>
-          <p:cNvSpPr txBox="1">
-            <a:spLocks noGrp="1"/>
-          </p:cNvSpPr>
-          <p:nvPr>
-            <p:ph type="body" idx="1"/>
-          </p:nvPr>
-        </p:nvSpPr>
-        <p:spPr>
-          <a:xfrm>
-            <a:off x="311700" y="1152475"/>
-            <a:ext cx="8520600" cy="3416400"/>
-          </a:xfrm>
-          <a:prstGeom prst="rect">
-            <a:avLst/>
-          </a:prstGeom>
-        </p:spPr>
-        <p:txBody>
-          <a:bodyPr spcFirstLastPara="1" wrap="square" lIns="91425" tIns="91425" rIns="91425" bIns="91425" anchor="t" anchorCtr="0">
-            <a:noAutofit/>
-          </a:bodyPr>
-          <a:lstStyle/>
-          <a:p>
-            <a:pPr marL="0" lvl="0" indent="0" algn="l" rtl="0">
-              <a:spcBef>
-                <a:spcPts val="0"/>
-              </a:spcBef>
-              <a:spcAft>
-                <a:spcPts val="1600"/>
-              </a:spcAft>
-              <a:buNone/>
-            </a:pPr>
-            <a:r>
-              <a:rPr lang="en-NZ" i="1" dirty="0"/>
-              <a:t>I’ve comprehensively tested my outcome to ensure that the functionality implication has been address (i.e., it works for expected, unexpected, and boundary values).</a:t>
-            </a:r>
-          </a:p>
-          <a:p>
-            <a:pPr marL="0" lvl="0" indent="0" algn="l" rtl="0">
-              <a:spcBef>
-                <a:spcPts val="0"/>
-              </a:spcBef>
-              <a:spcAft>
-                <a:spcPts val="1600"/>
-              </a:spcAft>
-              <a:buNone/>
-            </a:pPr>
-            <a:r>
-              <a:rPr lang="en-NZ" i="1" dirty="0"/>
-              <a:t>The inclusion of optional instructions and clear error messages help to make the out come easy to use (i.e., addresses the Usability implication)</a:t>
-            </a:r>
-          </a:p>
-          <a:p>
-            <a:pPr marL="0" lvl="0" indent="0" algn="l" rtl="0">
-              <a:spcBef>
-                <a:spcPts val="0"/>
-              </a:spcBef>
-              <a:spcAft>
-                <a:spcPts val="1600"/>
-              </a:spcAft>
-              <a:buNone/>
-            </a:pPr>
-            <a:r>
-              <a:rPr lang="en-NZ" i="1" dirty="0"/>
-              <a:t>I’ve also carefully spaced the program’s output and used a statement generator function to address the aesthetics implication. Whilst aesthetics is not the main focus of text based programs, ensuring the outcome looks good also helps address the usability implication.</a:t>
-            </a:r>
-          </a:p>
-        </p:txBody>
-      </p:sp>
-    </p:spTree>
-    <p:extLst>
-      <p:ext uri="{BB962C8B-B14F-4D97-AF65-F5344CB8AC3E}">
-        <p14:creationId xmlns:p14="http://schemas.microsoft.com/office/powerpoint/2010/main" val="251612550"/>
-      </p:ext>
-    </p:extLst>
-  </p:cSld>
-  <p:clrMapOvr>
-    <a:masterClrMapping/>
-  </p:clrMapOvr>
-</p:sld>
-</file>
-
 <file path=ppt/slides/slide27.xml><?xml version="1.0" encoding="utf-8"?>
 <p:sld xmlns:a="http://schemas.openxmlformats.org/drawingml/2006/main" xmlns:r="http://schemas.openxmlformats.org/officeDocument/2006/relationships" xmlns:p="http://schemas.openxmlformats.org/presentationml/2006/main">
   <p:cSld>
@@ -12218,17 +12321,46 @@
               <a:buNone/>
             </a:pPr>
             <a:r>
-              <a:rPr lang="en" i="1" dirty="0"/>
-              <a:t>Finally, my program has a limit on the amount users can spend. This addreses the social implicayion as we have a gambling game but want toensure that users do not spend an excessive amount of money. </a:t>
+              <a:rPr lang="en-NZ" i="1" dirty="0"/>
+              <a:t>I’ve comprehensively tested my outcome to ensure that the functionality implication has been address (i.e., it works for expected, unexpected, and boundary values).</a:t>
             </a:r>
-            <a:endParaRPr i="1" dirty="0"/>
+          </a:p>
+          <a:p>
+            <a:pPr marL="0" lvl="0" indent="0" algn="l" rtl="0">
+              <a:spcBef>
+                <a:spcPts val="0"/>
+              </a:spcBef>
+              <a:spcAft>
+                <a:spcPts val="1600"/>
+              </a:spcAft>
+              <a:buNone/>
+            </a:pPr>
+            <a:r>
+              <a:rPr lang="en-NZ" i="1" dirty="0"/>
+              <a:t>The inclusion of optional instructions and clear error messages help to make the out come easy to use (i.e., addresses the Usability implication)</a:t>
+            </a:r>
+          </a:p>
+          <a:p>
+            <a:pPr marL="0" lvl="0" indent="0" algn="l" rtl="0">
+              <a:spcBef>
+                <a:spcPts val="0"/>
+              </a:spcBef>
+              <a:spcAft>
+                <a:spcPts val="1600"/>
+              </a:spcAft>
+              <a:buNone/>
+            </a:pPr>
+            <a:r>
+              <a:rPr lang="en-NZ" i="1" dirty="0"/>
+              <a:t>I’ve also carefully spaced the program’s output and used a statement generator function to address the aesthetics implication. Whilst aesthetics is not the main focus of text based programs, ensuring the outcome looks good also helps address the usability implication.</a:t>
+            </a:r>
           </a:p>
         </p:txBody>
       </p:sp>
     </p:spTree>
     <p:extLst>
       <p:ext uri="{BB962C8B-B14F-4D97-AF65-F5344CB8AC3E}">
-        <p14:creationId xmlns:p14="http://schemas.microsoft.com/office/powerpoint/2010/main" val="824036131"/>
+        <p14:creationId xmlns:p14="http://schemas.microsoft.com/office/powerpoint/2010/main" val="251612550"/>
       </p:ext>
     </p:extLst>
   </p:cSld>
@@ -12291,6 +12423,120 @@
             </a:pPr>
             <a:r>
               <a:rPr lang="en" b="1" dirty="0"/>
+              <a:t>Addressing Relevant Implications</a:t>
+            </a:r>
+            <a:endParaRPr b="1" dirty="0"/>
+          </a:p>
+        </p:txBody>
+      </p:sp>
+      <p:sp>
+        <p:nvSpPr>
+          <p:cNvPr id="85" name="Google Shape;85;p18"/>
+          <p:cNvSpPr txBox="1">
+            <a:spLocks noGrp="1"/>
+          </p:cNvSpPr>
+          <p:nvPr>
+            <p:ph type="body" idx="1"/>
+          </p:nvPr>
+        </p:nvSpPr>
+        <p:spPr>
+          <a:xfrm>
+            <a:off x="311700" y="1152475"/>
+            <a:ext cx="8520600" cy="3416400"/>
+          </a:xfrm>
+          <a:prstGeom prst="rect">
+            <a:avLst/>
+          </a:prstGeom>
+        </p:spPr>
+        <p:txBody>
+          <a:bodyPr spcFirstLastPara="1" wrap="square" lIns="91425" tIns="91425" rIns="91425" bIns="91425" anchor="t" anchorCtr="0">
+            <a:noAutofit/>
+          </a:bodyPr>
+          <a:lstStyle/>
+          <a:p>
+            <a:pPr marL="0" lvl="0" indent="0" algn="l" rtl="0">
+              <a:spcBef>
+                <a:spcPts val="0"/>
+              </a:spcBef>
+              <a:spcAft>
+                <a:spcPts val="1600"/>
+              </a:spcAft>
+              <a:buNone/>
+            </a:pPr>
+            <a:r>
+              <a:rPr lang="en" i="1" dirty="0"/>
+              <a:t>Finally, my program has a limit on the amount users can spend. This addreses the social implicayion as we have a gambling game but want toensure that users do not spend an excessive amount of money. </a:t>
+            </a:r>
+            <a:endParaRPr i="1" dirty="0"/>
+          </a:p>
+        </p:txBody>
+      </p:sp>
+    </p:spTree>
+    <p:extLst>
+      <p:ext uri="{BB962C8B-B14F-4D97-AF65-F5344CB8AC3E}">
+        <p14:creationId xmlns:p14="http://schemas.microsoft.com/office/powerpoint/2010/main" val="824036131"/>
+      </p:ext>
+    </p:extLst>
+  </p:cSld>
+  <p:clrMapOvr>
+    <a:masterClrMapping/>
+  </p:clrMapOvr>
+</p:sld>
+</file>
+
+<file path=ppt/slides/slide29.xml><?xml version="1.0" encoding="utf-8"?>
+<p:sld xmlns:a="http://schemas.openxmlformats.org/drawingml/2006/main" xmlns:r="http://schemas.openxmlformats.org/officeDocument/2006/relationships" xmlns:p="http://schemas.openxmlformats.org/presentationml/2006/main">
+  <p:cSld>
+    <p:spTree>
+      <p:nvGrpSpPr>
+        <p:cNvPr id="1" name="Shape 83"/>
+        <p:cNvGrpSpPr/>
+        <p:nvPr/>
+      </p:nvGrpSpPr>
+      <p:grpSpPr>
+        <a:xfrm>
+          <a:off x="0" y="0"/>
+          <a:ext cx="0" cy="0"/>
+          <a:chOff x="0" y="0"/>
+          <a:chExt cx="0" cy="0"/>
+        </a:xfrm>
+      </p:grpSpPr>
+      <p:sp>
+        <p:nvSpPr>
+          <p:cNvPr id="84" name="Google Shape;84;p18"/>
+          <p:cNvSpPr txBox="1">
+            <a:spLocks noGrp="1"/>
+          </p:cNvSpPr>
+          <p:nvPr>
+            <p:ph type="title"/>
+          </p:nvPr>
+        </p:nvSpPr>
+        <p:spPr>
+          <a:xfrm>
+            <a:off x="311700" y="445025"/>
+            <a:ext cx="8520600" cy="572700"/>
+          </a:xfrm>
+          <a:prstGeom prst="rect">
+            <a:avLst/>
+          </a:prstGeom>
+        </p:spPr>
+        <p:txBody>
+          <a:bodyPr spcFirstLastPara="1" wrap="square" lIns="91425" tIns="91425" rIns="91425" bIns="91425" anchor="t" anchorCtr="0">
+            <a:noAutofit/>
+          </a:bodyPr>
+          <a:lstStyle/>
+          <a:p>
+            <a:pPr marL="0" lvl="0" indent="0" algn="l" rtl="0">
+              <a:spcBef>
+                <a:spcPts val="0"/>
+              </a:spcBef>
+              <a:spcAft>
+                <a:spcPts val="0"/>
+              </a:spcAft>
+              <a:buNone/>
+            </a:pPr>
+            <a:r>
+              <a:rPr lang="en" b="1" dirty="0"/>
               <a:t>Trialling Slide</a:t>
             </a:r>
             <a:endParaRPr b="1" dirty="0"/>
@@ -12353,6 +12599,572 @@
 </file>
 
 <file path=ppt/slides/slide3.xml><?xml version="1.0" encoding="utf-8"?>
+<p:sld xmlns:a="http://schemas.openxmlformats.org/drawingml/2006/main" xmlns:r="http://schemas.openxmlformats.org/officeDocument/2006/relationships" xmlns:p="http://schemas.openxmlformats.org/presentationml/2006/main">
+  <p:cSld>
+    <p:spTree>
+      <p:nvGrpSpPr>
+        <p:cNvPr id="1" name="Shape 77"/>
+        <p:cNvGrpSpPr/>
+        <p:nvPr/>
+      </p:nvGrpSpPr>
+      <p:grpSpPr>
+        <a:xfrm>
+          <a:off x="0" y="0"/>
+          <a:ext cx="0" cy="0"/>
+          <a:chOff x="0" y="0"/>
+          <a:chExt cx="0" cy="0"/>
+        </a:xfrm>
+      </p:grpSpPr>
+      <p:sp>
+        <p:nvSpPr>
+          <p:cNvPr id="78" name="Google Shape;78;p17"/>
+          <p:cNvSpPr txBox="1">
+            <a:spLocks noGrp="1"/>
+          </p:cNvSpPr>
+          <p:nvPr>
+            <p:ph type="title"/>
+          </p:nvPr>
+        </p:nvSpPr>
+        <p:spPr>
+          <a:xfrm>
+            <a:off x="311700" y="445025"/>
+            <a:ext cx="8520600" cy="572700"/>
+          </a:xfrm>
+          <a:prstGeom prst="rect">
+            <a:avLst/>
+          </a:prstGeom>
+        </p:spPr>
+        <p:txBody>
+          <a:bodyPr spcFirstLastPara="1" wrap="square" lIns="91425" tIns="91425" rIns="91425" bIns="91425" anchor="t" anchorCtr="0">
+            <a:noAutofit/>
+          </a:bodyPr>
+          <a:lstStyle/>
+          <a:p>
+            <a:pPr marL="0" lvl="0" indent="0" algn="l" rtl="0">
+              <a:spcBef>
+                <a:spcPts val="0"/>
+              </a:spcBef>
+              <a:spcAft>
+                <a:spcPts val="0"/>
+              </a:spcAft>
+              <a:buNone/>
+            </a:pPr>
+            <a:r>
+              <a:rPr lang="en" b="1" dirty="0"/>
+              <a:t>1. Get User Choice Test Plan</a:t>
+            </a:r>
+            <a:endParaRPr b="1" dirty="0"/>
+          </a:p>
+        </p:txBody>
+      </p:sp>
+      <p:graphicFrame>
+        <p:nvGraphicFramePr>
+          <p:cNvPr id="79" name="Google Shape;79;p17"/>
+          <p:cNvGraphicFramePr/>
+          <p:nvPr>
+            <p:extLst>
+              <p:ext uri="{D42A27DB-BD31-4B8C-83A1-F6EECF244321}">
+                <p14:modId xmlns:p14="http://schemas.microsoft.com/office/powerpoint/2010/main" val="1700002384"/>
+              </p:ext>
+            </p:extLst>
+          </p:nvPr>
+        </p:nvGraphicFramePr>
+        <p:xfrm>
+          <a:off x="382475" y="1267724"/>
+          <a:ext cx="8569368" cy="2986800"/>
+        </p:xfrm>
+        <a:graphic>
+          <a:graphicData uri="http://schemas.openxmlformats.org/drawingml/2006/table">
+            <a:tbl>
+              <a:tblPr>
+                <a:tableStyleId>{BDBED569-4797-4DF1-A0F4-6AAB3CD982D8}</a:tableStyleId>
+              </a:tblPr>
+              <a:tblGrid>
+                <a:gridCol w="4284684">
+                  <a:extLst>
+                    <a:ext uri="{9D8B030D-6E8A-4147-A177-3AD203B41FA5}">
+                      <a16:colId xmlns:a16="http://schemas.microsoft.com/office/drawing/2014/main" val="20000"/>
+                    </a:ext>
+                  </a:extLst>
+                </a:gridCol>
+                <a:gridCol w="4284684">
+                  <a:extLst>
+                    <a:ext uri="{9D8B030D-6E8A-4147-A177-3AD203B41FA5}">
+                      <a16:colId xmlns:a16="http://schemas.microsoft.com/office/drawing/2014/main" val="20001"/>
+                    </a:ext>
+                  </a:extLst>
+                </a:gridCol>
+              </a:tblGrid>
+              <a:tr h="359198">
+                <a:tc>
+                  <a:txBody>
+                    <a:bodyPr/>
+                    <a:lstStyle/>
+                    <a:p>
+                      <a:pPr marL="0" lvl="0" indent="0" algn="l" rtl="0">
+                        <a:spcBef>
+                          <a:spcPts val="0"/>
+                        </a:spcBef>
+                        <a:spcAft>
+                          <a:spcPts val="0"/>
+                        </a:spcAft>
+                        <a:buNone/>
+                      </a:pPr>
+                      <a:r>
+                        <a:rPr lang="en" sz="1600" b="1" dirty="0"/>
+                        <a:t>Test Data</a:t>
+                      </a:r>
+                      <a:endParaRPr sz="1600" b="1" dirty="0"/>
+                    </a:p>
+                  </a:txBody>
+                  <a:tcPr marL="91425" marR="91425" marT="91425" marB="91425"/>
+                </a:tc>
+                <a:tc>
+                  <a:txBody>
+                    <a:bodyPr/>
+                    <a:lstStyle/>
+                    <a:p>
+                      <a:pPr marL="0" lvl="0" indent="0" algn="l" rtl="0">
+                        <a:spcBef>
+                          <a:spcPts val="0"/>
+                        </a:spcBef>
+                        <a:spcAft>
+                          <a:spcPts val="0"/>
+                        </a:spcAft>
+                        <a:buNone/>
+                      </a:pPr>
+                      <a:r>
+                        <a:rPr lang="en" sz="1600" b="1" dirty="0"/>
+                        <a:t>Expected</a:t>
+                      </a:r>
+                      <a:endParaRPr sz="1600" b="1" dirty="0"/>
+                    </a:p>
+                  </a:txBody>
+                  <a:tcPr marL="91425" marR="91425" marT="91425" marB="91425"/>
+                </a:tc>
+                <a:extLst>
+                  <a:ext uri="{0D108BD9-81ED-4DB2-BD59-A6C34878D82A}">
+                    <a16:rowId xmlns:a16="http://schemas.microsoft.com/office/drawing/2014/main" val="10000"/>
+                  </a:ext>
+                </a:extLst>
+              </a:tr>
+              <a:tr h="359198">
+                <a:tc>
+                  <a:txBody>
+                    <a:bodyPr/>
+                    <a:lstStyle/>
+                    <a:p>
+                      <a:pPr marL="0" lvl="0" indent="0" algn="l" rtl="0">
+                        <a:spcBef>
+                          <a:spcPts val="0"/>
+                        </a:spcBef>
+                        <a:spcAft>
+                          <a:spcPts val="0"/>
+                        </a:spcAft>
+                        <a:buNone/>
+                      </a:pPr>
+                      <a:r>
+                        <a:rPr lang="en-NZ" sz="1200" dirty="0"/>
+                        <a:t>Rock</a:t>
+                      </a:r>
+                    </a:p>
+                  </a:txBody>
+                  <a:tcPr marL="91425" marR="91425" marT="91425" marB="91425"/>
+                </a:tc>
+                <a:tc>
+                  <a:txBody>
+                    <a:bodyPr/>
+                    <a:lstStyle/>
+                    <a:p>
+                      <a:pPr marL="0" lvl="0" indent="0" algn="l" rtl="0">
+                        <a:spcBef>
+                          <a:spcPts val="0"/>
+                        </a:spcBef>
+                        <a:spcAft>
+                          <a:spcPts val="0"/>
+                        </a:spcAft>
+                        <a:buNone/>
+                      </a:pPr>
+                      <a:r>
+                        <a:rPr lang="en-US" sz="1200" dirty="0"/>
+                        <a:t>Accepted, changed to ‘rock’ (note lower case)</a:t>
+                      </a:r>
+                    </a:p>
+                  </a:txBody>
+                  <a:tcPr marL="91425" marR="91425" marT="91425" marB="91425"/>
+                </a:tc>
+                <a:extLst>
+                  <a:ext uri="{0D108BD9-81ED-4DB2-BD59-A6C34878D82A}">
+                    <a16:rowId xmlns:a16="http://schemas.microsoft.com/office/drawing/2014/main" val="10001"/>
+                  </a:ext>
+                </a:extLst>
+              </a:tr>
+              <a:tr h="359198">
+                <a:tc>
+                  <a:txBody>
+                    <a:bodyPr/>
+                    <a:lstStyle/>
+                    <a:p>
+                      <a:pPr marL="0" lvl="0" indent="0" algn="l" rtl="0">
+                        <a:spcBef>
+                          <a:spcPts val="0"/>
+                        </a:spcBef>
+                        <a:spcAft>
+                          <a:spcPts val="0"/>
+                        </a:spcAft>
+                        <a:buNone/>
+                      </a:pPr>
+                      <a:r>
+                        <a:rPr lang="en-NZ" sz="1200" dirty="0"/>
+                        <a:t>Paper</a:t>
+                      </a:r>
+                      <a:endParaRPr sz="1200" dirty="0"/>
+                    </a:p>
+                  </a:txBody>
+                  <a:tcPr marL="91425" marR="91425" marT="91425" marB="91425"/>
+                </a:tc>
+                <a:tc>
+                  <a:txBody>
+                    <a:bodyPr/>
+                    <a:lstStyle/>
+                    <a:p>
+                      <a:pPr marL="0" lvl="0" indent="0" algn="l" rtl="0">
+                        <a:spcBef>
+                          <a:spcPts val="0"/>
+                        </a:spcBef>
+                        <a:spcAft>
+                          <a:spcPts val="0"/>
+                        </a:spcAft>
+                        <a:buNone/>
+                      </a:pPr>
+                      <a:r>
+                        <a:rPr lang="en-NZ" sz="1200" dirty="0"/>
+                        <a:t>Accepted, changed to ‘paper’</a:t>
+                      </a:r>
+                    </a:p>
+                  </a:txBody>
+                  <a:tcPr marL="91425" marR="91425" marT="91425" marB="91425"/>
+                </a:tc>
+                <a:extLst>
+                  <a:ext uri="{0D108BD9-81ED-4DB2-BD59-A6C34878D82A}">
+                    <a16:rowId xmlns:a16="http://schemas.microsoft.com/office/drawing/2014/main" val="4058153661"/>
+                  </a:ext>
+                </a:extLst>
+              </a:tr>
+              <a:tr h="359198">
+                <a:tc>
+                  <a:txBody>
+                    <a:bodyPr/>
+                    <a:lstStyle/>
+                    <a:p>
+                      <a:pPr marL="0" lvl="0" indent="0" algn="l" rtl="0">
+                        <a:spcBef>
+                          <a:spcPts val="0"/>
+                        </a:spcBef>
+                        <a:spcAft>
+                          <a:spcPts val="0"/>
+                        </a:spcAft>
+                        <a:buNone/>
+                      </a:pPr>
+                      <a:r>
+                        <a:rPr lang="en-NZ" sz="1200" dirty="0"/>
+                        <a:t>Scissors</a:t>
+                      </a:r>
+                      <a:endParaRPr sz="1200" dirty="0"/>
+                    </a:p>
+                  </a:txBody>
+                  <a:tcPr marL="91425" marR="91425" marT="91425" marB="91425"/>
+                </a:tc>
+                <a:tc>
+                  <a:txBody>
+                    <a:bodyPr/>
+                    <a:lstStyle/>
+                    <a:p>
+                      <a:pPr marL="0" marR="0" lvl="0" indent="0" algn="l" defTabSz="914400" rtl="0" eaLnBrk="1" fontAlgn="auto" latinLnBrk="0" hangingPunct="1">
+                        <a:lnSpc>
+                          <a:spcPct val="100000"/>
+                        </a:lnSpc>
+                        <a:spcBef>
+                          <a:spcPts val="0"/>
+                        </a:spcBef>
+                        <a:spcAft>
+                          <a:spcPts val="0"/>
+                        </a:spcAft>
+                        <a:buClr>
+                          <a:srgbClr val="000000"/>
+                        </a:buClr>
+                        <a:buSzTx/>
+                        <a:buFont typeface="Arial"/>
+                        <a:buNone/>
+                        <a:tabLst/>
+                        <a:defRPr/>
+                      </a:pPr>
+                      <a:r>
+                        <a:rPr lang="en-NZ" sz="1200" dirty="0"/>
+                        <a:t>Accepted, stays as ‘scissors’</a:t>
+                      </a:r>
+                    </a:p>
+                  </a:txBody>
+                  <a:tcPr marL="91425" marR="91425" marT="91425" marB="91425"/>
+                </a:tc>
+                <a:extLst>
+                  <a:ext uri="{0D108BD9-81ED-4DB2-BD59-A6C34878D82A}">
+                    <a16:rowId xmlns:a16="http://schemas.microsoft.com/office/drawing/2014/main" val="1082202218"/>
+                  </a:ext>
+                </a:extLst>
+              </a:tr>
+              <a:tr h="359198">
+                <a:tc>
+                  <a:txBody>
+                    <a:bodyPr/>
+                    <a:lstStyle/>
+                    <a:p>
+                      <a:pPr marL="0" lvl="0" indent="0" algn="l" rtl="0">
+                        <a:spcBef>
+                          <a:spcPts val="0"/>
+                        </a:spcBef>
+                        <a:spcAft>
+                          <a:spcPts val="0"/>
+                        </a:spcAft>
+                        <a:buNone/>
+                      </a:pPr>
+                      <a:r>
+                        <a:rPr lang="en-NZ" sz="1200" dirty="0"/>
+                        <a:t>R</a:t>
+                      </a:r>
+                      <a:endParaRPr sz="1200" dirty="0"/>
+                    </a:p>
+                  </a:txBody>
+                  <a:tcPr marL="91425" marR="91425" marT="91425" marB="91425"/>
+                </a:tc>
+                <a:tc>
+                  <a:txBody>
+                    <a:bodyPr/>
+                    <a:lstStyle/>
+                    <a:p>
+                      <a:pPr marL="0" marR="0" lvl="0" indent="0" algn="l" defTabSz="914400" rtl="0" eaLnBrk="1" fontAlgn="auto" latinLnBrk="0" hangingPunct="1">
+                        <a:lnSpc>
+                          <a:spcPct val="100000"/>
+                        </a:lnSpc>
+                        <a:spcBef>
+                          <a:spcPts val="0"/>
+                        </a:spcBef>
+                        <a:spcAft>
+                          <a:spcPts val="0"/>
+                        </a:spcAft>
+                        <a:buClr>
+                          <a:srgbClr val="000000"/>
+                        </a:buClr>
+                        <a:buSzTx/>
+                        <a:buFont typeface="Arial"/>
+                        <a:buNone/>
+                        <a:tabLst/>
+                        <a:defRPr/>
+                      </a:pPr>
+                      <a:r>
+                        <a:rPr lang="en-NZ" sz="1200" dirty="0"/>
+                        <a:t>Accepted, changed to ‘rock’</a:t>
+                      </a:r>
+                    </a:p>
+                  </a:txBody>
+                  <a:tcPr marL="91425" marR="91425" marT="91425" marB="91425"/>
+                </a:tc>
+                <a:extLst>
+                  <a:ext uri="{0D108BD9-81ED-4DB2-BD59-A6C34878D82A}">
+                    <a16:rowId xmlns:a16="http://schemas.microsoft.com/office/drawing/2014/main" val="3943354146"/>
+                  </a:ext>
+                </a:extLst>
+              </a:tr>
+              <a:tr h="359198">
+                <a:tc>
+                  <a:txBody>
+                    <a:bodyPr/>
+                    <a:lstStyle/>
+                    <a:p>
+                      <a:pPr marL="0" lvl="0" indent="0" algn="l" rtl="0">
+                        <a:spcBef>
+                          <a:spcPts val="0"/>
+                        </a:spcBef>
+                        <a:spcAft>
+                          <a:spcPts val="0"/>
+                        </a:spcAft>
+                        <a:buNone/>
+                      </a:pPr>
+                      <a:r>
+                        <a:rPr lang="en-NZ" sz="1200" dirty="0"/>
+                        <a:t>P</a:t>
+                      </a:r>
+                      <a:endParaRPr sz="1200" dirty="0"/>
+                    </a:p>
+                  </a:txBody>
+                  <a:tcPr marL="91425" marR="91425" marT="91425" marB="91425"/>
+                </a:tc>
+                <a:tc>
+                  <a:txBody>
+                    <a:bodyPr/>
+                    <a:lstStyle/>
+                    <a:p>
+                      <a:pPr marL="0" marR="0" lvl="0" indent="0" algn="l" defTabSz="914400" rtl="0" eaLnBrk="1" fontAlgn="auto" latinLnBrk="0" hangingPunct="1">
+                        <a:lnSpc>
+                          <a:spcPct val="100000"/>
+                        </a:lnSpc>
+                        <a:spcBef>
+                          <a:spcPts val="0"/>
+                        </a:spcBef>
+                        <a:spcAft>
+                          <a:spcPts val="0"/>
+                        </a:spcAft>
+                        <a:buClr>
+                          <a:srgbClr val="000000"/>
+                        </a:buClr>
+                        <a:buSzTx/>
+                        <a:buFont typeface="Arial"/>
+                        <a:buNone/>
+                        <a:tabLst/>
+                        <a:defRPr/>
+                      </a:pPr>
+                      <a:r>
+                        <a:rPr lang="en-NZ" sz="1200" dirty="0"/>
+                        <a:t>Accepted, changed to ‘paper’</a:t>
+                      </a:r>
+                    </a:p>
+                  </a:txBody>
+                  <a:tcPr marL="91425" marR="91425" marT="91425" marB="91425"/>
+                </a:tc>
+                <a:extLst>
+                  <a:ext uri="{0D108BD9-81ED-4DB2-BD59-A6C34878D82A}">
+                    <a16:rowId xmlns:a16="http://schemas.microsoft.com/office/drawing/2014/main" val="233044927"/>
+                  </a:ext>
+                </a:extLst>
+              </a:tr>
+              <a:tr h="359198">
+                <a:tc>
+                  <a:txBody>
+                    <a:bodyPr/>
+                    <a:lstStyle/>
+                    <a:p>
+                      <a:pPr marL="0" lvl="0" indent="0" algn="l" rtl="0">
+                        <a:spcBef>
+                          <a:spcPts val="0"/>
+                        </a:spcBef>
+                        <a:spcAft>
+                          <a:spcPts val="0"/>
+                        </a:spcAft>
+                        <a:buNone/>
+                      </a:pPr>
+                      <a:r>
+                        <a:rPr lang="en-NZ" sz="1200" dirty="0"/>
+                        <a:t>S</a:t>
+                      </a:r>
+                      <a:endParaRPr sz="1200" dirty="0"/>
+                    </a:p>
+                  </a:txBody>
+                  <a:tcPr marL="91425" marR="91425" marT="91425" marB="91425"/>
+                </a:tc>
+                <a:tc>
+                  <a:txBody>
+                    <a:bodyPr/>
+                    <a:lstStyle/>
+                    <a:p>
+                      <a:pPr marL="0" marR="0" lvl="0" indent="0" algn="l" defTabSz="914400" rtl="0" eaLnBrk="1" fontAlgn="auto" latinLnBrk="0" hangingPunct="1">
+                        <a:lnSpc>
+                          <a:spcPct val="100000"/>
+                        </a:lnSpc>
+                        <a:spcBef>
+                          <a:spcPts val="0"/>
+                        </a:spcBef>
+                        <a:spcAft>
+                          <a:spcPts val="0"/>
+                        </a:spcAft>
+                        <a:buClr>
+                          <a:srgbClr val="000000"/>
+                        </a:buClr>
+                        <a:buSzTx/>
+                        <a:buFont typeface="Arial"/>
+                        <a:buNone/>
+                        <a:tabLst/>
+                        <a:defRPr/>
+                      </a:pPr>
+                      <a:r>
+                        <a:rPr lang="en-NZ" sz="1200" dirty="0"/>
+                        <a:t>Accepted, changed to ‘scissors’</a:t>
+                      </a:r>
+                    </a:p>
+                  </a:txBody>
+                  <a:tcPr marL="91425" marR="91425" marT="91425" marB="91425"/>
+                </a:tc>
+                <a:extLst>
+                  <a:ext uri="{0D108BD9-81ED-4DB2-BD59-A6C34878D82A}">
+                    <a16:rowId xmlns:a16="http://schemas.microsoft.com/office/drawing/2014/main" val="3435702399"/>
+                  </a:ext>
+                </a:extLst>
+              </a:tr>
+              <a:tr h="359198">
+                <a:tc>
+                  <a:txBody>
+                    <a:bodyPr/>
+                    <a:lstStyle/>
+                    <a:p>
+                      <a:pPr marL="0" lvl="0" indent="0" algn="l" rtl="0">
+                        <a:spcBef>
+                          <a:spcPts val="0"/>
+                        </a:spcBef>
+                        <a:spcAft>
+                          <a:spcPts val="0"/>
+                        </a:spcAft>
+                        <a:buNone/>
+                      </a:pPr>
+                      <a:r>
+                        <a:rPr lang="en-NZ" sz="1200" dirty="0"/>
+                        <a:t>&lt;enter&gt;</a:t>
+                      </a:r>
+                      <a:endParaRPr sz="1200" dirty="0"/>
+                    </a:p>
+                  </a:txBody>
+                  <a:tcPr marL="91425" marR="91425" marT="91425" marB="91425"/>
+                </a:tc>
+                <a:tc>
+                  <a:txBody>
+                    <a:bodyPr/>
+                    <a:lstStyle/>
+                    <a:p>
+                      <a:pPr marL="0" lvl="0" indent="0" algn="l" rtl="0">
+                        <a:spcBef>
+                          <a:spcPts val="0"/>
+                        </a:spcBef>
+                        <a:spcAft>
+                          <a:spcPts val="0"/>
+                        </a:spcAft>
+                        <a:buNone/>
+                      </a:pPr>
+                      <a:r>
+                        <a:rPr lang="en-NZ" sz="1200" dirty="0"/>
+                        <a:t>Error message ‘please enter rock, paper, or scissors’</a:t>
+                      </a:r>
+                      <a:endParaRPr sz="1200" dirty="0"/>
+                    </a:p>
+                  </a:txBody>
+                  <a:tcPr marL="91425" marR="91425" marT="91425" marB="91425"/>
+                </a:tc>
+                <a:extLst>
+                  <a:ext uri="{0D108BD9-81ED-4DB2-BD59-A6C34878D82A}">
+                    <a16:rowId xmlns:a16="http://schemas.microsoft.com/office/drawing/2014/main" val="1575967252"/>
+                  </a:ext>
+                </a:extLst>
+              </a:tr>
+            </a:tbl>
+          </a:graphicData>
+        </a:graphic>
+      </p:graphicFrame>
+    </p:spTree>
+  </p:cSld>
+  <p:clrMapOvr>
+    <a:masterClrMapping/>
+  </p:clrMapOvr>
+</p:sld>
+</file>
+
+<file path=ppt/slides/slide4.xml><?xml version="1.0" encoding="utf-8"?>
 <p:sld xmlns:a="http://schemas.openxmlformats.org/drawingml/2006/main" xmlns:r="http://schemas.openxmlformats.org/officeDocument/2006/relationships" xmlns:p="http://schemas.openxmlformats.org/presentationml/2006/main">
   <p:cSld>
     <p:bg>
@@ -12412,8 +13224,8 @@
               <a:buNone/>
             </a:pPr>
             <a:r>
-              <a:rPr lang="en" b="1" dirty="0"/>
-              <a:t>Component 1 (Trello screenshot)</a:t>
+              <a:rPr lang="en" b="1"/>
+              <a:t>Get user choice</a:t>
             </a:r>
             <a:endParaRPr b="1" dirty="0"/>
           </a:p>
@@ -12457,7 +13269,7 @@
 </p:sld>
 </file>
 
-<file path=ppt/slides/slide4.xml><?xml version="1.0" encoding="utf-8"?>
+<file path=ppt/slides/slide5.xml><?xml version="1.0" encoding="utf-8"?>
 <p:sld xmlns:a="http://schemas.openxmlformats.org/drawingml/2006/main" xmlns:r="http://schemas.openxmlformats.org/officeDocument/2006/relationships" xmlns:p="http://schemas.openxmlformats.org/presentationml/2006/main">
   <p:cSld>
     <p:spTree>
@@ -12520,13 +13332,7 @@
         <p:nvGraphicFramePr>
           <p:cNvPr id="79" name="Google Shape;79;p17"/>
           <p:cNvGraphicFramePr/>
-          <p:nvPr>
-            <p:extLst>
-              <p:ext uri="{D42A27DB-BD31-4B8C-83A1-F6EECF244321}">
-                <p14:modId xmlns:p14="http://schemas.microsoft.com/office/powerpoint/2010/main" val="743301387"/>
-              </p:ext>
-            </p:extLst>
-          </p:nvPr>
+          <p:nvPr/>
         </p:nvGraphicFramePr>
         <p:xfrm>
           <a:off x="382475" y="1267724"/>
@@ -12747,6 +13553,11 @@
         </a:graphic>
       </p:graphicFrame>
     </p:spTree>
+    <p:extLst>
+      <p:ext uri="{BB962C8B-B14F-4D97-AF65-F5344CB8AC3E}">
+        <p14:creationId xmlns:p14="http://schemas.microsoft.com/office/powerpoint/2010/main" val="2007169343"/>
+      </p:ext>
+    </p:extLst>
   </p:cSld>
   <p:clrMapOvr>
     <a:masterClrMapping/>
@@ -12754,7 +13565,7 @@
 </p:sld>
 </file>
 
-<file path=ppt/slides/slide5.xml><?xml version="1.0" encoding="utf-8"?>
+<file path=ppt/slides/slide6.xml><?xml version="1.0" encoding="utf-8"?>
 <p:sld xmlns:a="http://schemas.openxmlformats.org/drawingml/2006/main" xmlns:r="http://schemas.openxmlformats.org/officeDocument/2006/relationships" xmlns:p="http://schemas.openxmlformats.org/presentationml/2006/main">
   <p:cSld>
     <p:spTree>
@@ -13138,7 +13949,7 @@
 </p:sld>
 </file>
 
-<file path=ppt/slides/slide6.xml><?xml version="1.0" encoding="utf-8"?>
+<file path=ppt/slides/slide7.xml><?xml version="1.0" encoding="utf-8"?>
 <p:sld xmlns:a="http://schemas.openxmlformats.org/drawingml/2006/main" xmlns:r="http://schemas.openxmlformats.org/officeDocument/2006/relationships" xmlns:p="http://schemas.openxmlformats.org/presentationml/2006/main">
   <p:cSld>
     <p:spTree>
@@ -13276,7 +14087,7 @@
 </p:sld>
 </file>
 
-<file path=ppt/slides/slide7.xml><?xml version="1.0" encoding="utf-8"?>
+<file path=ppt/slides/slide8.xml><?xml version="1.0" encoding="utf-8"?>
 <p:sld xmlns:a="http://schemas.openxmlformats.org/drawingml/2006/main" xmlns:r="http://schemas.openxmlformats.org/officeDocument/2006/relationships" xmlns:p="http://schemas.openxmlformats.org/presentationml/2006/main">
   <p:cSld>
     <p:bg>
@@ -13418,7 +14229,7 @@
 </p:sld>
 </file>
 
-<file path=ppt/slides/slide8.xml><?xml version="1.0" encoding="utf-8"?>
+<file path=ppt/slides/slide9.xml><?xml version="1.0" encoding="utf-8"?>
 <p:sld xmlns:a="http://schemas.openxmlformats.org/drawingml/2006/main" xmlns:r="http://schemas.openxmlformats.org/officeDocument/2006/relationships" xmlns:p="http://schemas.openxmlformats.org/presentationml/2006/main">
   <p:cSld>
     <p:spTree>
@@ -13651,150 +14462,6 @@
     <p:extLst>
       <p:ext uri="{BB962C8B-B14F-4D97-AF65-F5344CB8AC3E}">
         <p14:creationId xmlns:p14="http://schemas.microsoft.com/office/powerpoint/2010/main" val="256831694"/>
-      </p:ext>
-    </p:extLst>
-  </p:cSld>
-  <p:clrMapOvr>
-    <a:masterClrMapping/>
-  </p:clrMapOvr>
-</p:sld>
-</file>
-
-<file path=ppt/slides/slide9.xml><?xml version="1.0" encoding="utf-8"?>
-<p:sld xmlns:a="http://schemas.openxmlformats.org/drawingml/2006/main" xmlns:r="http://schemas.openxmlformats.org/officeDocument/2006/relationships" xmlns:p="http://schemas.openxmlformats.org/presentationml/2006/main">
-  <p:cSld>
-    <p:spTree>
-      <p:nvGrpSpPr>
-        <p:cNvPr id="1" name="Shape 83"/>
-        <p:cNvGrpSpPr/>
-        <p:nvPr/>
-      </p:nvGrpSpPr>
-      <p:grpSpPr>
-        <a:xfrm>
-          <a:off x="0" y="0"/>
-          <a:ext cx="0" cy="0"/>
-          <a:chOff x="0" y="0"/>
-          <a:chExt cx="0" cy="0"/>
-        </a:xfrm>
-      </p:grpSpPr>
-      <p:sp>
-        <p:nvSpPr>
-          <p:cNvPr id="84" name="Google Shape;84;p18"/>
-          <p:cNvSpPr txBox="1">
-            <a:spLocks noGrp="1"/>
-          </p:cNvSpPr>
-          <p:nvPr>
-            <p:ph type="title"/>
-          </p:nvPr>
-        </p:nvSpPr>
-        <p:spPr>
-          <a:xfrm>
-            <a:off x="311700" y="445025"/>
-            <a:ext cx="8520600" cy="572700"/>
-          </a:xfrm>
-          <a:prstGeom prst="rect">
-            <a:avLst/>
-          </a:prstGeom>
-        </p:spPr>
-        <p:txBody>
-          <a:bodyPr spcFirstLastPara="1" wrap="square" lIns="91425" tIns="91425" rIns="91425" bIns="91425" anchor="t" anchorCtr="0">
-            <a:noAutofit/>
-          </a:bodyPr>
-          <a:lstStyle/>
-          <a:p>
-            <a:pPr marL="0" lvl="0" indent="0" algn="l" rtl="0">
-              <a:spcBef>
-                <a:spcPts val="0"/>
-              </a:spcBef>
-              <a:spcAft>
-                <a:spcPts val="0"/>
-              </a:spcAft>
-              <a:buNone/>
-            </a:pPr>
-            <a:r>
-              <a:rPr lang="en" b="1" dirty="0"/>
-              <a:t>How Much? (Ask for user input)</a:t>
-            </a:r>
-            <a:endParaRPr b="1" dirty="0"/>
-          </a:p>
-        </p:txBody>
-      </p:sp>
-      <p:sp>
-        <p:nvSpPr>
-          <p:cNvPr id="85" name="Google Shape;85;p18"/>
-          <p:cNvSpPr txBox="1">
-            <a:spLocks noGrp="1"/>
-          </p:cNvSpPr>
-          <p:nvPr>
-            <p:ph type="body" idx="1"/>
-          </p:nvPr>
-        </p:nvSpPr>
-        <p:spPr>
-          <a:xfrm>
-            <a:off x="311699" y="1152475"/>
-            <a:ext cx="3862735" cy="3416400"/>
-          </a:xfrm>
-          <a:prstGeom prst="rect">
-            <a:avLst/>
-          </a:prstGeom>
-        </p:spPr>
-        <p:txBody>
-          <a:bodyPr spcFirstLastPara="1" wrap="square" lIns="91425" tIns="91425" rIns="91425" bIns="91425" anchor="t" anchorCtr="0">
-            <a:noAutofit/>
-          </a:bodyPr>
-          <a:lstStyle/>
-          <a:p>
-            <a:pPr marL="0" lvl="0" indent="0" algn="l" rtl="0">
-              <a:spcBef>
-                <a:spcPts val="0"/>
-              </a:spcBef>
-              <a:spcAft>
-                <a:spcPts val="1600"/>
-              </a:spcAft>
-              <a:buNone/>
-            </a:pPr>
-            <a:r>
-              <a:rPr lang="en" i="1" dirty="0"/>
-              <a:t>The plan is to develop a number checking function as part of this component. </a:t>
-            </a:r>
-            <a:endParaRPr i="1" dirty="0"/>
-          </a:p>
-        </p:txBody>
-      </p:sp>
-      <p:pic>
-        <p:nvPicPr>
-          <p:cNvPr id="4" name="Picture 3">
-            <a:extLst>
-              <a:ext uri="{FF2B5EF4-FFF2-40B4-BE49-F238E27FC236}">
-                <a16:creationId xmlns:a16="http://schemas.microsoft.com/office/drawing/2014/main" id="{4DA01C25-380E-4BFC-B554-48EFA4E33AC7}"/>
-              </a:ext>
-            </a:extLst>
-          </p:cNvPr>
-          <p:cNvPicPr>
-            <a:picLocks noChangeAspect="1"/>
-          </p:cNvPicPr>
-          <p:nvPr/>
-        </p:nvPicPr>
-        <p:blipFill>
-          <a:blip r:embed="rId3"/>
-          <a:stretch>
-            <a:fillRect/>
-          </a:stretch>
-        </p:blipFill>
-        <p:spPr>
-          <a:xfrm>
-            <a:off x="4572000" y="1222441"/>
-            <a:ext cx="3717462" cy="3416400"/>
-          </a:xfrm>
-          <a:prstGeom prst="rect">
-            <a:avLst/>
-          </a:prstGeom>
-        </p:spPr>
-      </p:pic>
-    </p:spTree>
-    <p:extLst>
-      <p:ext uri="{BB962C8B-B14F-4D97-AF65-F5344CB8AC3E}">
-        <p14:creationId xmlns:p14="http://schemas.microsoft.com/office/powerpoint/2010/main" val="359406329"/>
       </p:ext>
     </p:extLst>
   </p:cSld>
@@ -14367,12 +15034,6 @@
 </file>
 
 <file path=customXml/item1.xml><?xml version="1.0" encoding="utf-8"?>
-<p:properties xmlns:p="http://schemas.microsoft.com/office/2006/metadata/properties" xmlns:xsi="http://www.w3.org/2001/XMLSchema-instance" xmlns:pc="http://schemas.microsoft.com/office/infopath/2007/PartnerControls">
-  <documentManagement/>
-</p:properties>
-</file>
-
-<file path=customXml/item2.xml><?xml version="1.0" encoding="utf-8"?>
 <ct:contentTypeSchema xmlns:ct="http://schemas.microsoft.com/office/2006/metadata/contentType" xmlns:ma="http://schemas.microsoft.com/office/2006/metadata/properties/metaAttributes" ct:_="" ma:_="" ma:contentTypeName="Document" ma:contentTypeID="0x010100CA5D8974BE78F944A108BF13F2B4CD6A" ma:contentTypeVersion="5" ma:contentTypeDescription="Create a new document." ma:contentTypeScope="" ma:versionID="1e3fc9c3ad9c16f936602fded155d02d">
   <xsd:schema xmlns:xsd="http://www.w3.org/2001/XMLSchema" xmlns:xs="http://www.w3.org/2001/XMLSchema" xmlns:p="http://schemas.microsoft.com/office/2006/metadata/properties" xmlns:ns2="4f936efd-07e9-48ba-b668-2cff2968e155" targetNamespace="http://schemas.microsoft.com/office/2006/metadata/properties" ma:root="true" ma:fieldsID="642a89d75a32cde1551b8a68a7f33533" ns2:_="">
     <xsd:import namespace="4f936efd-07e9-48ba-b668-2cff2968e155"/>
@@ -14524,6 +15185,12 @@
 </ct:contentTypeSchema>
 </file>
 
+<file path=customXml/item2.xml><?xml version="1.0" encoding="utf-8"?>
+<p:properties xmlns:p="http://schemas.microsoft.com/office/2006/metadata/properties" xmlns:xsi="http://www.w3.org/2001/XMLSchema-instance" xmlns:pc="http://schemas.microsoft.com/office/infopath/2007/PartnerControls">
+  <documentManagement/>
+</p:properties>
+</file>
+
 <file path=customXml/item3.xml><?xml version="1.0" encoding="utf-8"?>
 <?mso-contentType ?>
 <FormTemplates xmlns="http://schemas.microsoft.com/sharepoint/v3/contenttype/forms">
@@ -14534,15 +15201,6 @@
 </file>
 
 <file path=customXml/itemProps1.xml><?xml version="1.0" encoding="utf-8"?>
-<ds:datastoreItem xmlns:ds="http://schemas.openxmlformats.org/officeDocument/2006/customXml" ds:itemID="{516D10BD-0186-4A00-BD37-17D1BDE22574}">
-  <ds:schemaRefs>
-    <ds:schemaRef ds:uri="http://schemas.microsoft.com/office/2006/metadata/properties"/>
-    <ds:schemaRef ds:uri="http://schemas.microsoft.com/office/infopath/2007/PartnerControls"/>
-  </ds:schemaRefs>
-</ds:datastoreItem>
-</file>
-
-<file path=customXml/itemProps2.xml><?xml version="1.0" encoding="utf-8"?>
 <ds:datastoreItem xmlns:ds="http://schemas.openxmlformats.org/officeDocument/2006/customXml" ds:itemID="{ECB9EDA7-7083-49EA-8C49-43EBAAC54B35}">
   <ds:schemaRefs>
     <ds:schemaRef ds:uri="http://schemas.microsoft.com/office/2006/metadata/contentType"/>
@@ -14560,6 +15218,15 @@
 </ds:datastoreItem>
 </file>
 
+<file path=customXml/itemProps2.xml><?xml version="1.0" encoding="utf-8"?>
+<ds:datastoreItem xmlns:ds="http://schemas.openxmlformats.org/officeDocument/2006/customXml" ds:itemID="{516D10BD-0186-4A00-BD37-17D1BDE22574}">
+  <ds:schemaRefs>
+    <ds:schemaRef ds:uri="http://schemas.microsoft.com/office/2006/metadata/properties"/>
+    <ds:schemaRef ds:uri="http://schemas.microsoft.com/office/infopath/2007/PartnerControls"/>
+  </ds:schemaRefs>
+</ds:datastoreItem>
+</file>
+
 <file path=customXml/itemProps3.xml><?xml version="1.0" encoding="utf-8"?>
 <ds:datastoreItem xmlns:ds="http://schemas.openxmlformats.org/officeDocument/2006/customXml" ds:itemID="{C55A4F12-1C67-45BB-AEF0-B8BD3F656B95}">
   <ds:schemaRefs>

</xml_diff>